<commit_message>
Update day1 slides for 2019
</commit_message>
<xml_diff>
--- a/Doc/day1_1_PerkLabResearchMethodology.pptx
+++ b/Doc/day1_1_PerkLabResearchMethodology.pptx
@@ -5,7 +5,7 @@
     <p:sldMasterId id="2147483648" r:id="rId1"/>
   </p:sldMasterIdLst>
   <p:notesMasterIdLst>
-    <p:notesMasterId r:id="rId17"/>
+    <p:notesMasterId r:id="rId15"/>
   </p:notesMasterIdLst>
   <p:sldIdLst>
     <p:sldId id="256" r:id="rId2"/>
@@ -18,11 +18,9 @@
     <p:sldId id="507" r:id="rId9"/>
     <p:sldId id="508" r:id="rId10"/>
     <p:sldId id="495" r:id="rId11"/>
-    <p:sldId id="516" r:id="rId12"/>
-    <p:sldId id="314" r:id="rId13"/>
-    <p:sldId id="517" r:id="rId14"/>
-    <p:sldId id="518" r:id="rId15"/>
-    <p:sldId id="406" r:id="rId16"/>
+    <p:sldId id="314" r:id="rId12"/>
+    <p:sldId id="517" r:id="rId13"/>
+    <p:sldId id="406" r:id="rId14"/>
   </p:sldIdLst>
   <p:sldSz cx="9144000" cy="6858000" type="screen4x3"/>
   <p:notesSz cx="6858000" cy="9144000"/>
@@ -146,1843 +144,6 @@
     <p1510:client id="{B57E0680-A95C-43EF-A75C-0DAF055C0475}" v="1" dt="2018-04-30T15:06:48.173"/>
   </p1510:revLst>
 </p1510:revInfo>
-</file>
-
-<file path=ppt/charts/chart1.xml><?xml version="1.0" encoding="utf-8"?>
-<c:chartSpace xmlns:c="http://schemas.openxmlformats.org/drawingml/2006/chart" xmlns:a="http://schemas.openxmlformats.org/drawingml/2006/main" xmlns:r="http://schemas.openxmlformats.org/officeDocument/2006/relationships" xmlns:c16r2="http://schemas.microsoft.com/office/drawing/2015/06/chart">
-  <c:date1904 val="0"/>
-  <c:lang val="en-US"/>
-  <c:roundedCorners val="0"/>
-  <mc:AlternateContent xmlns:mc="http://schemas.openxmlformats.org/markup-compatibility/2006">
-    <mc:Choice xmlns:c14="http://schemas.microsoft.com/office/drawing/2007/8/2/chart" Requires="c14">
-      <c14:style val="102"/>
-    </mc:Choice>
-    <mc:Fallback>
-      <c:style val="2"/>
-    </mc:Fallback>
-  </mc:AlternateContent>
-  <c:chart>
-    <c:title>
-      <c:tx>
-        <c:rich>
-          <a:bodyPr rot="0" spcFirstLastPara="1" vertOverflow="ellipsis" vert="horz" wrap="square" anchor="ctr" anchorCtr="1"/>
-          <a:lstStyle/>
-          <a:p>
-            <a:pPr>
-              <a:defRPr sz="1600" b="1" i="0" u="none" strike="noStrike" kern="1200" cap="all" baseline="0">
-                <a:solidFill>
-                  <a:schemeClr val="tx1">
-                    <a:lumMod val="65000"/>
-                    <a:lumOff val="35000"/>
-                  </a:schemeClr>
-                </a:solidFill>
-                <a:latin typeface="+mn-lt"/>
-                <a:ea typeface="+mn-ea"/>
-                <a:cs typeface="+mn-cs"/>
-              </a:defRPr>
-            </a:pPr>
-            <a:r>
-              <a:rPr lang="en-CA" dirty="0" err="1"/>
-              <a:t>LineS</a:t>
-            </a:r>
-            <a:r>
-              <a:rPr lang="en-CA" dirty="0"/>
-              <a:t> of source code - </a:t>
-            </a:r>
-            <a:r>
-              <a:rPr lang="en-CA" sz="1600" b="1" i="0" u="none" strike="noStrike" cap="all" baseline="0" dirty="0">
-                <a:effectLst/>
-              </a:rPr>
-              <a:t>Illustrated through </a:t>
-            </a:r>
-            <a:r>
-              <a:rPr lang="en-CA" sz="1600" b="1" i="0" u="none" strike="noStrike" cap="all" baseline="0" dirty="0" err="1">
-                <a:effectLst/>
-              </a:rPr>
-              <a:t>lumpnav</a:t>
-            </a:r>
-            <a:endParaRPr lang="en-CA" dirty="0"/>
-          </a:p>
-        </c:rich>
-      </c:tx>
-      <c:overlay val="0"/>
-      <c:spPr>
-        <a:noFill/>
-        <a:ln>
-          <a:noFill/>
-        </a:ln>
-        <a:effectLst/>
-      </c:spPr>
-      <c:txPr>
-        <a:bodyPr rot="0" spcFirstLastPara="1" vertOverflow="ellipsis" vert="horz" wrap="square" anchor="ctr" anchorCtr="1"/>
-        <a:lstStyle/>
-        <a:p>
-          <a:pPr>
-            <a:defRPr sz="1600" b="1" i="0" u="none" strike="noStrike" kern="1200" cap="all" baseline="0">
-              <a:solidFill>
-                <a:schemeClr val="tx1">
-                  <a:lumMod val="65000"/>
-                  <a:lumOff val="35000"/>
-                </a:schemeClr>
-              </a:solidFill>
-              <a:latin typeface="+mn-lt"/>
-              <a:ea typeface="+mn-ea"/>
-              <a:cs typeface="+mn-cs"/>
-            </a:defRPr>
-          </a:pPr>
-          <a:endParaRPr lang="en-US"/>
-        </a:p>
-      </c:txPr>
-    </c:title>
-    <c:autoTitleDeleted val="0"/>
-    <c:plotArea>
-      <c:layout>
-        <c:manualLayout>
-          <c:layoutTarget val="inner"/>
-          <c:xMode val="edge"/>
-          <c:yMode val="edge"/>
-          <c:x val="5.5493885109821436E-2"/>
-          <c:y val="0.17459149826292356"/>
-          <c:w val="0.83646707922195118"/>
-          <c:h val="0.73553858722770638"/>
-        </c:manualLayout>
-      </c:layout>
-      <c:ofPieChart>
-        <c:ofPieType val="bar"/>
-        <c:varyColors val="1"/>
-        <c:ser>
-          <c:idx val="0"/>
-          <c:order val="0"/>
-          <c:tx>
-            <c:strRef>
-              <c:f>Sheet1!$B$1</c:f>
-              <c:strCache>
-                <c:ptCount val="1"/>
-                <c:pt idx="0">
-                  <c:v>LineS of source code</c:v>
-                </c:pt>
-              </c:strCache>
-            </c:strRef>
-          </c:tx>
-          <c:explosion val="4"/>
-          <c:dPt>
-            <c:idx val="0"/>
-            <c:bubble3D val="0"/>
-            <c:spPr>
-              <a:solidFill>
-                <a:schemeClr val="accent1"/>
-              </a:solidFill>
-              <a:ln>
-                <a:noFill/>
-              </a:ln>
-              <a:effectLst>
-                <a:outerShdw blurRad="63500" sx="102000" sy="102000" algn="ctr" rotWithShape="0">
-                  <a:prstClr val="black">
-                    <a:alpha val="20000"/>
-                  </a:prstClr>
-                </a:outerShdw>
-              </a:effectLst>
-            </c:spPr>
-            <c:extLst>
-              <c:ext xmlns:c16="http://schemas.microsoft.com/office/drawing/2014/chart" uri="{C3380CC4-5D6E-409C-BE32-E72D297353CC}">
-                <c16:uniqueId val="{00000001-25FE-4BEA-A144-51BEC28A0A36}"/>
-              </c:ext>
-            </c:extLst>
-          </c:dPt>
-          <c:dPt>
-            <c:idx val="1"/>
-            <c:bubble3D val="0"/>
-            <c:spPr>
-              <a:solidFill>
-                <a:schemeClr val="accent2"/>
-              </a:solidFill>
-              <a:ln>
-                <a:noFill/>
-              </a:ln>
-              <a:effectLst>
-                <a:outerShdw blurRad="63500" sx="102000" sy="102000" algn="ctr" rotWithShape="0">
-                  <a:prstClr val="black">
-                    <a:alpha val="20000"/>
-                  </a:prstClr>
-                </a:outerShdw>
-              </a:effectLst>
-            </c:spPr>
-            <c:extLst>
-              <c:ext xmlns:c16="http://schemas.microsoft.com/office/drawing/2014/chart" uri="{C3380CC4-5D6E-409C-BE32-E72D297353CC}">
-                <c16:uniqueId val="{00000003-25FE-4BEA-A144-51BEC28A0A36}"/>
-              </c:ext>
-            </c:extLst>
-          </c:dPt>
-          <c:dPt>
-            <c:idx val="2"/>
-            <c:bubble3D val="0"/>
-            <c:spPr>
-              <a:solidFill>
-                <a:schemeClr val="accent3"/>
-              </a:solidFill>
-              <a:ln>
-                <a:noFill/>
-              </a:ln>
-              <a:effectLst>
-                <a:outerShdw blurRad="63500" sx="102000" sy="102000" algn="ctr" rotWithShape="0">
-                  <a:prstClr val="black">
-                    <a:alpha val="20000"/>
-                  </a:prstClr>
-                </a:outerShdw>
-              </a:effectLst>
-            </c:spPr>
-            <c:extLst>
-              <c:ext xmlns:c16="http://schemas.microsoft.com/office/drawing/2014/chart" uri="{C3380CC4-5D6E-409C-BE32-E72D297353CC}">
-                <c16:uniqueId val="{00000005-25FE-4BEA-A144-51BEC28A0A36}"/>
-              </c:ext>
-            </c:extLst>
-          </c:dPt>
-          <c:dPt>
-            <c:idx val="3"/>
-            <c:bubble3D val="0"/>
-            <c:spPr>
-              <a:solidFill>
-                <a:schemeClr val="accent4"/>
-              </a:solidFill>
-              <a:ln>
-                <a:noFill/>
-              </a:ln>
-              <a:effectLst>
-                <a:outerShdw blurRad="63500" sx="102000" sy="102000" algn="ctr" rotWithShape="0">
-                  <a:prstClr val="black">
-                    <a:alpha val="20000"/>
-                  </a:prstClr>
-                </a:outerShdw>
-              </a:effectLst>
-            </c:spPr>
-            <c:extLst>
-              <c:ext xmlns:c16="http://schemas.microsoft.com/office/drawing/2014/chart" uri="{C3380CC4-5D6E-409C-BE32-E72D297353CC}">
-                <c16:uniqueId val="{00000007-25FE-4BEA-A144-51BEC28A0A36}"/>
-              </c:ext>
-            </c:extLst>
-          </c:dPt>
-          <c:dPt>
-            <c:idx val="4"/>
-            <c:bubble3D val="0"/>
-            <c:spPr>
-              <a:solidFill>
-                <a:schemeClr val="accent5"/>
-              </a:solidFill>
-              <a:ln>
-                <a:noFill/>
-              </a:ln>
-              <a:effectLst>
-                <a:outerShdw blurRad="63500" sx="102000" sy="102000" algn="ctr" rotWithShape="0">
-                  <a:prstClr val="black">
-                    <a:alpha val="20000"/>
-                  </a:prstClr>
-                </a:outerShdw>
-              </a:effectLst>
-            </c:spPr>
-            <c:extLst>
-              <c:ext xmlns:c16="http://schemas.microsoft.com/office/drawing/2014/chart" uri="{C3380CC4-5D6E-409C-BE32-E72D297353CC}">
-                <c16:uniqueId val="{00000009-25FE-4BEA-A144-51BEC28A0A36}"/>
-              </c:ext>
-            </c:extLst>
-          </c:dPt>
-          <c:dPt>
-            <c:idx val="5"/>
-            <c:bubble3D val="0"/>
-            <c:spPr>
-              <a:solidFill>
-                <a:schemeClr val="accent6"/>
-              </a:solidFill>
-              <a:ln>
-                <a:noFill/>
-              </a:ln>
-              <a:effectLst>
-                <a:outerShdw blurRad="63500" sx="102000" sy="102000" algn="ctr" rotWithShape="0">
-                  <a:prstClr val="black">
-                    <a:alpha val="20000"/>
-                  </a:prstClr>
-                </a:outerShdw>
-              </a:effectLst>
-            </c:spPr>
-            <c:extLst>
-              <c:ext xmlns:c16="http://schemas.microsoft.com/office/drawing/2014/chart" uri="{C3380CC4-5D6E-409C-BE32-E72D297353CC}">
-                <c16:uniqueId val="{0000000B-25FE-4BEA-A144-51BEC28A0A36}"/>
-              </c:ext>
-            </c:extLst>
-          </c:dPt>
-          <c:dPt>
-            <c:idx val="6"/>
-            <c:bubble3D val="0"/>
-            <c:spPr>
-              <a:solidFill>
-                <a:schemeClr val="accent1">
-                  <a:lumMod val="60000"/>
-                </a:schemeClr>
-              </a:solidFill>
-              <a:ln>
-                <a:noFill/>
-              </a:ln>
-              <a:effectLst>
-                <a:outerShdw blurRad="63500" sx="102000" sy="102000" algn="ctr" rotWithShape="0">
-                  <a:prstClr val="black">
-                    <a:alpha val="20000"/>
-                  </a:prstClr>
-                </a:outerShdw>
-              </a:effectLst>
-            </c:spPr>
-            <c:extLst>
-              <c:ext xmlns:c16="http://schemas.microsoft.com/office/drawing/2014/chart" uri="{C3380CC4-5D6E-409C-BE32-E72D297353CC}">
-                <c16:uniqueId val="{0000000D-25FE-4BEA-A144-51BEC28A0A36}"/>
-              </c:ext>
-            </c:extLst>
-          </c:dPt>
-          <c:dPt>
-            <c:idx val="7"/>
-            <c:bubble3D val="0"/>
-            <c:spPr>
-              <a:solidFill>
-                <a:schemeClr val="accent2">
-                  <a:lumMod val="60000"/>
-                </a:schemeClr>
-              </a:solidFill>
-              <a:ln>
-                <a:noFill/>
-              </a:ln>
-              <a:effectLst>
-                <a:outerShdw blurRad="63500" sx="102000" sy="102000" algn="ctr" rotWithShape="0">
-                  <a:prstClr val="black">
-                    <a:alpha val="20000"/>
-                  </a:prstClr>
-                </a:outerShdw>
-              </a:effectLst>
-            </c:spPr>
-            <c:extLst>
-              <c:ext xmlns:c16="http://schemas.microsoft.com/office/drawing/2014/chart" uri="{C3380CC4-5D6E-409C-BE32-E72D297353CC}">
-                <c16:uniqueId val="{0000000F-25FE-4BEA-A144-51BEC28A0A36}"/>
-              </c:ext>
-            </c:extLst>
-          </c:dPt>
-          <c:dPt>
-            <c:idx val="8"/>
-            <c:bubble3D val="0"/>
-            <c:spPr>
-              <a:solidFill>
-                <a:schemeClr val="accent3">
-                  <a:lumMod val="60000"/>
-                </a:schemeClr>
-              </a:solidFill>
-              <a:ln>
-                <a:noFill/>
-              </a:ln>
-              <a:effectLst>
-                <a:outerShdw blurRad="63500" sx="102000" sy="102000" algn="ctr" rotWithShape="0">
-                  <a:prstClr val="black">
-                    <a:alpha val="20000"/>
-                  </a:prstClr>
-                </a:outerShdw>
-              </a:effectLst>
-            </c:spPr>
-            <c:extLst>
-              <c:ext xmlns:c16="http://schemas.microsoft.com/office/drawing/2014/chart" uri="{C3380CC4-5D6E-409C-BE32-E72D297353CC}">
-                <c16:uniqueId val="{00000011-25FE-4BEA-A144-51BEC28A0A36}"/>
-              </c:ext>
-            </c:extLst>
-          </c:dPt>
-          <c:dPt>
-            <c:idx val="9"/>
-            <c:bubble3D val="0"/>
-            <c:explosion val="5"/>
-            <c:spPr>
-              <a:solidFill>
-                <a:schemeClr val="accent1">
-                  <a:lumMod val="40000"/>
-                  <a:lumOff val="60000"/>
-                </a:schemeClr>
-              </a:solidFill>
-              <a:ln>
-                <a:noFill/>
-              </a:ln>
-              <a:effectLst>
-                <a:outerShdw blurRad="63500" sx="102000" sy="102000" algn="ctr" rotWithShape="0">
-                  <a:prstClr val="black">
-                    <a:alpha val="20000"/>
-                  </a:prstClr>
-                </a:outerShdw>
-              </a:effectLst>
-            </c:spPr>
-            <c:extLst>
-              <c:ext xmlns:c16="http://schemas.microsoft.com/office/drawing/2014/chart" uri="{C3380CC4-5D6E-409C-BE32-E72D297353CC}">
-                <c16:uniqueId val="{00000013-25FE-4BEA-A144-51BEC28A0A36}"/>
-              </c:ext>
-            </c:extLst>
-          </c:dPt>
-          <c:dPt>
-            <c:idx val="10"/>
-            <c:bubble3D val="0"/>
-            <c:explosion val="14"/>
-            <c:spPr>
-              <a:solidFill>
-                <a:schemeClr val="accent5">
-                  <a:lumMod val="60000"/>
-                </a:schemeClr>
-              </a:solidFill>
-              <a:ln>
-                <a:noFill/>
-              </a:ln>
-              <a:effectLst>
-                <a:outerShdw blurRad="63500" sx="102000" sy="102000" algn="ctr" rotWithShape="0">
-                  <a:prstClr val="black">
-                    <a:alpha val="20000"/>
-                  </a:prstClr>
-                </a:outerShdw>
-              </a:effectLst>
-            </c:spPr>
-            <c:extLst>
-              <c:ext xmlns:c16="http://schemas.microsoft.com/office/drawing/2014/chart" uri="{C3380CC4-5D6E-409C-BE32-E72D297353CC}">
-                <c16:uniqueId val="{00000015-25FE-4BEA-A144-51BEC28A0A36}"/>
-              </c:ext>
-            </c:extLst>
-          </c:dPt>
-          <c:dPt>
-            <c:idx val="11"/>
-            <c:bubble3D val="0"/>
-            <c:spPr>
-              <a:solidFill>
-                <a:schemeClr val="accent6">
-                  <a:lumMod val="60000"/>
-                </a:schemeClr>
-              </a:solidFill>
-              <a:ln>
-                <a:noFill/>
-              </a:ln>
-              <a:effectLst>
-                <a:outerShdw blurRad="63500" sx="102000" sy="102000" algn="ctr" rotWithShape="0">
-                  <a:prstClr val="black">
-                    <a:alpha val="20000"/>
-                  </a:prstClr>
-                </a:outerShdw>
-              </a:effectLst>
-            </c:spPr>
-            <c:extLst>
-              <c:ext xmlns:c16="http://schemas.microsoft.com/office/drawing/2014/chart" uri="{C3380CC4-5D6E-409C-BE32-E72D297353CC}">
-                <c16:uniqueId val="{00000017-25FE-4BEA-A144-51BEC28A0A36}"/>
-              </c:ext>
-            </c:extLst>
-          </c:dPt>
-          <c:dPt>
-            <c:idx val="12"/>
-            <c:bubble3D val="0"/>
-            <c:spPr>
-              <a:solidFill>
-                <a:schemeClr val="accent1">
-                  <a:lumMod val="80000"/>
-                  <a:lumOff val="20000"/>
-                </a:schemeClr>
-              </a:solidFill>
-              <a:ln>
-                <a:noFill/>
-              </a:ln>
-              <a:effectLst>
-                <a:outerShdw blurRad="63500" sx="102000" sy="102000" algn="ctr" rotWithShape="0">
-                  <a:prstClr val="black">
-                    <a:alpha val="20000"/>
-                  </a:prstClr>
-                </a:outerShdw>
-              </a:effectLst>
-            </c:spPr>
-            <c:extLst>
-              <c:ext xmlns:c16="http://schemas.microsoft.com/office/drawing/2014/chart" uri="{C3380CC4-5D6E-409C-BE32-E72D297353CC}">
-                <c16:uniqueId val="{00000019-25FE-4BEA-A144-51BEC28A0A36}"/>
-              </c:ext>
-            </c:extLst>
-          </c:dPt>
-          <c:dLbls>
-            <c:dLbl>
-              <c:idx val="0"/>
-              <c:layout>
-                <c:manualLayout>
-                  <c:x val="7.0060200744541338E-3"/>
-                  <c:y val="0.18294569176690662"/>
-                </c:manualLayout>
-              </c:layout>
-              <c:numFmt formatCode="0.0%" sourceLinked="0"/>
-              <c:spPr>
-                <a:noFill/>
-                <a:ln>
-                  <a:noFill/>
-                </a:ln>
-                <a:effectLst/>
-              </c:spPr>
-              <c:txPr>
-                <a:bodyPr rot="0" spcFirstLastPara="1" vertOverflow="ellipsis" vert="horz" wrap="square" lIns="38100" tIns="19050" rIns="38100" bIns="19050" anchor="ctr" anchorCtr="1">
-                  <a:spAutoFit/>
-                </a:bodyPr>
-                <a:lstStyle/>
-                <a:p>
-                  <a:pPr>
-                    <a:defRPr sz="1000" b="1" i="0" u="none" strike="noStrike" kern="1200" spc="0" baseline="0">
-                      <a:solidFill>
-                        <a:schemeClr val="accent1"/>
-                      </a:solidFill>
-                      <a:latin typeface="+mn-lt"/>
-                      <a:ea typeface="+mn-ea"/>
-                      <a:cs typeface="+mn-cs"/>
-                    </a:defRPr>
-                  </a:pPr>
-                  <a:endParaRPr lang="en-US"/>
-                </a:p>
-              </c:txPr>
-              <c:dLblPos val="bestFit"/>
-              <c:showLegendKey val="0"/>
-              <c:showVal val="0"/>
-              <c:showCatName val="1"/>
-              <c:showSerName val="0"/>
-              <c:showPercent val="1"/>
-              <c:showBubbleSize val="0"/>
-              <c:extLst>
-                <c:ext xmlns:c15="http://schemas.microsoft.com/office/drawing/2012/chart" uri="{CE6537A1-D6FC-4f65-9D91-7224C49458BB}"/>
-                <c:ext xmlns:c16="http://schemas.microsoft.com/office/drawing/2014/chart" uri="{C3380CC4-5D6E-409C-BE32-E72D297353CC}">
-                  <c16:uniqueId val="{00000001-25FE-4BEA-A144-51BEC28A0A36}"/>
-                </c:ext>
-              </c:extLst>
-            </c:dLbl>
-            <c:dLbl>
-              <c:idx val="1"/>
-              <c:numFmt formatCode="0.0%" sourceLinked="0"/>
-              <c:spPr>
-                <a:noFill/>
-                <a:ln>
-                  <a:noFill/>
-                </a:ln>
-                <a:effectLst/>
-              </c:spPr>
-              <c:txPr>
-                <a:bodyPr rot="0" spcFirstLastPara="1" vertOverflow="ellipsis" vert="horz" wrap="square" lIns="38100" tIns="19050" rIns="38100" bIns="19050" anchor="ctr" anchorCtr="1">
-                  <a:spAutoFit/>
-                </a:bodyPr>
-                <a:lstStyle/>
-                <a:p>
-                  <a:pPr>
-                    <a:defRPr sz="1000" b="1" i="0" u="none" strike="noStrike" kern="1200" spc="0" baseline="0">
-                      <a:solidFill>
-                        <a:schemeClr val="accent2"/>
-                      </a:solidFill>
-                      <a:latin typeface="+mn-lt"/>
-                      <a:ea typeface="+mn-ea"/>
-                      <a:cs typeface="+mn-cs"/>
-                    </a:defRPr>
-                  </a:pPr>
-                  <a:endParaRPr lang="en-US"/>
-                </a:p>
-              </c:txPr>
-              <c:dLblPos val="outEnd"/>
-              <c:showLegendKey val="0"/>
-              <c:showVal val="0"/>
-              <c:showCatName val="1"/>
-              <c:showSerName val="0"/>
-              <c:showPercent val="1"/>
-              <c:showBubbleSize val="0"/>
-              <c:extLst>
-                <c:ext xmlns:c16="http://schemas.microsoft.com/office/drawing/2014/chart" uri="{C3380CC4-5D6E-409C-BE32-E72D297353CC}">
-                  <c16:uniqueId val="{00000003-25FE-4BEA-A144-51BEC28A0A36}"/>
-                </c:ext>
-              </c:extLst>
-            </c:dLbl>
-            <c:dLbl>
-              <c:idx val="2"/>
-              <c:numFmt formatCode="0.0%" sourceLinked="0"/>
-              <c:spPr>
-                <a:noFill/>
-                <a:ln>
-                  <a:noFill/>
-                </a:ln>
-                <a:effectLst/>
-              </c:spPr>
-              <c:txPr>
-                <a:bodyPr rot="0" spcFirstLastPara="1" vertOverflow="ellipsis" vert="horz" wrap="square" lIns="38100" tIns="19050" rIns="38100" bIns="19050" anchor="ctr" anchorCtr="1">
-                  <a:spAutoFit/>
-                </a:bodyPr>
-                <a:lstStyle/>
-                <a:p>
-                  <a:pPr>
-                    <a:defRPr sz="1000" b="1" i="0" u="none" strike="noStrike" kern="1200" spc="0" baseline="0">
-                      <a:solidFill>
-                        <a:schemeClr val="accent3"/>
-                      </a:solidFill>
-                      <a:latin typeface="+mn-lt"/>
-                      <a:ea typeface="+mn-ea"/>
-                      <a:cs typeface="+mn-cs"/>
-                    </a:defRPr>
-                  </a:pPr>
-                  <a:endParaRPr lang="en-US"/>
-                </a:p>
-              </c:txPr>
-              <c:dLblPos val="outEnd"/>
-              <c:showLegendKey val="0"/>
-              <c:showVal val="0"/>
-              <c:showCatName val="1"/>
-              <c:showSerName val="0"/>
-              <c:showPercent val="1"/>
-              <c:showBubbleSize val="0"/>
-              <c:extLst>
-                <c:ext xmlns:c16="http://schemas.microsoft.com/office/drawing/2014/chart" uri="{C3380CC4-5D6E-409C-BE32-E72D297353CC}">
-                  <c16:uniqueId val="{00000005-25FE-4BEA-A144-51BEC28A0A36}"/>
-                </c:ext>
-              </c:extLst>
-            </c:dLbl>
-            <c:dLbl>
-              <c:idx val="3"/>
-              <c:numFmt formatCode="0.0%" sourceLinked="0"/>
-              <c:spPr>
-                <a:noFill/>
-                <a:ln>
-                  <a:noFill/>
-                </a:ln>
-                <a:effectLst/>
-              </c:spPr>
-              <c:txPr>
-                <a:bodyPr rot="0" spcFirstLastPara="1" vertOverflow="ellipsis" vert="horz" wrap="square" lIns="38100" tIns="19050" rIns="38100" bIns="19050" anchor="ctr" anchorCtr="1">
-                  <a:spAutoFit/>
-                </a:bodyPr>
-                <a:lstStyle/>
-                <a:p>
-                  <a:pPr>
-                    <a:defRPr sz="1000" b="1" i="0" u="none" strike="noStrike" kern="1200" spc="0" baseline="0">
-                      <a:solidFill>
-                        <a:schemeClr val="accent4"/>
-                      </a:solidFill>
-                      <a:latin typeface="+mn-lt"/>
-                      <a:ea typeface="+mn-ea"/>
-                      <a:cs typeface="+mn-cs"/>
-                    </a:defRPr>
-                  </a:pPr>
-                  <a:endParaRPr lang="en-US"/>
-                </a:p>
-              </c:txPr>
-              <c:dLblPos val="outEnd"/>
-              <c:showLegendKey val="0"/>
-              <c:showVal val="0"/>
-              <c:showCatName val="1"/>
-              <c:showSerName val="0"/>
-              <c:showPercent val="1"/>
-              <c:showBubbleSize val="0"/>
-              <c:extLst>
-                <c:ext xmlns:c16="http://schemas.microsoft.com/office/drawing/2014/chart" uri="{C3380CC4-5D6E-409C-BE32-E72D297353CC}">
-                  <c16:uniqueId val="{00000007-25FE-4BEA-A144-51BEC28A0A36}"/>
-                </c:ext>
-              </c:extLst>
-            </c:dLbl>
-            <c:dLbl>
-              <c:idx val="4"/>
-              <c:numFmt formatCode="0.0%" sourceLinked="0"/>
-              <c:spPr>
-                <a:noFill/>
-                <a:ln>
-                  <a:noFill/>
-                </a:ln>
-                <a:effectLst/>
-              </c:spPr>
-              <c:txPr>
-                <a:bodyPr rot="0" spcFirstLastPara="1" vertOverflow="ellipsis" vert="horz" wrap="square" lIns="38100" tIns="19050" rIns="38100" bIns="19050" anchor="ctr" anchorCtr="1">
-                  <a:spAutoFit/>
-                </a:bodyPr>
-                <a:lstStyle/>
-                <a:p>
-                  <a:pPr>
-                    <a:defRPr sz="1000" b="1" i="0" u="none" strike="noStrike" kern="1200" spc="0" baseline="0">
-                      <a:solidFill>
-                        <a:schemeClr val="accent5"/>
-                      </a:solidFill>
-                      <a:latin typeface="+mn-lt"/>
-                      <a:ea typeface="+mn-ea"/>
-                      <a:cs typeface="+mn-cs"/>
-                    </a:defRPr>
-                  </a:pPr>
-                  <a:endParaRPr lang="en-US"/>
-                </a:p>
-              </c:txPr>
-              <c:dLblPos val="outEnd"/>
-              <c:showLegendKey val="0"/>
-              <c:showVal val="0"/>
-              <c:showCatName val="1"/>
-              <c:showSerName val="0"/>
-              <c:showPercent val="1"/>
-              <c:showBubbleSize val="0"/>
-              <c:extLst>
-                <c:ext xmlns:c16="http://schemas.microsoft.com/office/drawing/2014/chart" uri="{C3380CC4-5D6E-409C-BE32-E72D297353CC}">
-                  <c16:uniqueId val="{00000009-25FE-4BEA-A144-51BEC28A0A36}"/>
-                </c:ext>
-              </c:extLst>
-            </c:dLbl>
-            <c:dLbl>
-              <c:idx val="5"/>
-              <c:numFmt formatCode="0.0%" sourceLinked="0"/>
-              <c:spPr>
-                <a:noFill/>
-                <a:ln>
-                  <a:noFill/>
-                </a:ln>
-                <a:effectLst/>
-              </c:spPr>
-              <c:txPr>
-                <a:bodyPr rot="0" spcFirstLastPara="1" vertOverflow="ellipsis" vert="horz" wrap="square" lIns="38100" tIns="19050" rIns="38100" bIns="19050" anchor="ctr" anchorCtr="1">
-                  <a:spAutoFit/>
-                </a:bodyPr>
-                <a:lstStyle/>
-                <a:p>
-                  <a:pPr>
-                    <a:defRPr sz="1000" b="1" i="0" u="none" strike="noStrike" kern="1200" spc="0" baseline="0">
-                      <a:solidFill>
-                        <a:schemeClr val="accent6"/>
-                      </a:solidFill>
-                      <a:latin typeface="+mn-lt"/>
-                      <a:ea typeface="+mn-ea"/>
-                      <a:cs typeface="+mn-cs"/>
-                    </a:defRPr>
-                  </a:pPr>
-                  <a:endParaRPr lang="en-US"/>
-                </a:p>
-              </c:txPr>
-              <c:dLblPos val="outEnd"/>
-              <c:showLegendKey val="0"/>
-              <c:showVal val="0"/>
-              <c:showCatName val="1"/>
-              <c:showSerName val="0"/>
-              <c:showPercent val="1"/>
-              <c:showBubbleSize val="0"/>
-              <c:extLst>
-                <c:ext xmlns:c16="http://schemas.microsoft.com/office/drawing/2014/chart" uri="{C3380CC4-5D6E-409C-BE32-E72D297353CC}">
-                  <c16:uniqueId val="{0000000B-25FE-4BEA-A144-51BEC28A0A36}"/>
-                </c:ext>
-              </c:extLst>
-            </c:dLbl>
-            <c:dLbl>
-              <c:idx val="6"/>
-              <c:layout>
-                <c:manualLayout>
-                  <c:x val="1.7515050186135334E-3"/>
-                  <c:y val="-4.5199525068784725E-2"/>
-                </c:manualLayout>
-              </c:layout>
-              <c:numFmt formatCode="0.0%" sourceLinked="0"/>
-              <c:spPr>
-                <a:noFill/>
-                <a:ln>
-                  <a:noFill/>
-                </a:ln>
-                <a:effectLst/>
-              </c:spPr>
-              <c:txPr>
-                <a:bodyPr rot="0" spcFirstLastPara="1" vertOverflow="ellipsis" vert="horz" wrap="square" lIns="38100" tIns="19050" rIns="38100" bIns="19050" anchor="ctr" anchorCtr="1">
-                  <a:spAutoFit/>
-                </a:bodyPr>
-                <a:lstStyle/>
-                <a:p>
-                  <a:pPr>
-                    <a:defRPr sz="1000" b="1" i="0" u="none" strike="noStrike" kern="1200" spc="0" baseline="0">
-                      <a:solidFill>
-                        <a:schemeClr val="accent1">
-                          <a:lumMod val="60000"/>
-                        </a:schemeClr>
-                      </a:solidFill>
-                      <a:latin typeface="+mn-lt"/>
-                      <a:ea typeface="+mn-ea"/>
-                      <a:cs typeface="+mn-cs"/>
-                    </a:defRPr>
-                  </a:pPr>
-                  <a:endParaRPr lang="en-US"/>
-                </a:p>
-              </c:txPr>
-              <c:dLblPos val="bestFit"/>
-              <c:showLegendKey val="0"/>
-              <c:showVal val="0"/>
-              <c:showCatName val="1"/>
-              <c:showSerName val="0"/>
-              <c:showPercent val="1"/>
-              <c:showBubbleSize val="0"/>
-              <c:extLst>
-                <c:ext xmlns:c15="http://schemas.microsoft.com/office/drawing/2012/chart" uri="{CE6537A1-D6FC-4f65-9D91-7224C49458BB}"/>
-                <c:ext xmlns:c16="http://schemas.microsoft.com/office/drawing/2014/chart" uri="{C3380CC4-5D6E-409C-BE32-E72D297353CC}">
-                  <c16:uniqueId val="{0000000D-25FE-4BEA-A144-51BEC28A0A36}"/>
-                </c:ext>
-              </c:extLst>
-            </c:dLbl>
-            <c:dLbl>
-              <c:idx val="7"/>
-              <c:layout>
-                <c:manualLayout>
-                  <c:x val="7.5314715800381876E-2"/>
-                  <c:y val="-0.20411250586278315"/>
-                </c:manualLayout>
-              </c:layout>
-              <c:numFmt formatCode="0.0%" sourceLinked="0"/>
-              <c:spPr>
-                <a:noFill/>
-                <a:ln>
-                  <a:noFill/>
-                </a:ln>
-                <a:effectLst/>
-              </c:spPr>
-              <c:txPr>
-                <a:bodyPr rot="0" spcFirstLastPara="1" vertOverflow="ellipsis" vert="horz" wrap="square" lIns="38100" tIns="19050" rIns="38100" bIns="19050" anchor="ctr" anchorCtr="1">
-                  <a:spAutoFit/>
-                </a:bodyPr>
-                <a:lstStyle/>
-                <a:p>
-                  <a:pPr>
-                    <a:defRPr sz="1000" b="1" i="0" u="none" strike="noStrike" kern="1200" spc="0" baseline="0">
-                      <a:solidFill>
-                        <a:schemeClr val="accent2">
-                          <a:lumMod val="60000"/>
-                        </a:schemeClr>
-                      </a:solidFill>
-                      <a:latin typeface="+mn-lt"/>
-                      <a:ea typeface="+mn-ea"/>
-                      <a:cs typeface="+mn-cs"/>
-                    </a:defRPr>
-                  </a:pPr>
-                  <a:endParaRPr lang="en-US"/>
-                </a:p>
-              </c:txPr>
-              <c:dLblPos val="bestFit"/>
-              <c:showLegendKey val="0"/>
-              <c:showVal val="0"/>
-              <c:showCatName val="1"/>
-              <c:showSerName val="0"/>
-              <c:showPercent val="1"/>
-              <c:showBubbleSize val="0"/>
-              <c:extLst>
-                <c:ext xmlns:c15="http://schemas.microsoft.com/office/drawing/2012/chart" uri="{CE6537A1-D6FC-4f65-9D91-7224C49458BB}"/>
-                <c:ext xmlns:c16="http://schemas.microsoft.com/office/drawing/2014/chart" uri="{C3380CC4-5D6E-409C-BE32-E72D297353CC}">
-                  <c16:uniqueId val="{0000000F-25FE-4BEA-A144-51BEC28A0A36}"/>
-                </c:ext>
-              </c:extLst>
-            </c:dLbl>
-            <c:dLbl>
-              <c:idx val="8"/>
-              <c:layout>
-                <c:manualLayout>
-                  <c:x val="5.7799665614246543E-2"/>
-                  <c:y val="-0.17699269315932542"/>
-                </c:manualLayout>
-              </c:layout>
-              <c:numFmt formatCode="0.0%" sourceLinked="0"/>
-              <c:spPr>
-                <a:noFill/>
-                <a:ln>
-                  <a:noFill/>
-                </a:ln>
-                <a:effectLst/>
-              </c:spPr>
-              <c:txPr>
-                <a:bodyPr rot="0" spcFirstLastPara="1" vertOverflow="ellipsis" vert="horz" wrap="square" lIns="38100" tIns="19050" rIns="38100" bIns="19050" anchor="ctr" anchorCtr="1">
-                  <a:spAutoFit/>
-                </a:bodyPr>
-                <a:lstStyle/>
-                <a:p>
-                  <a:pPr>
-                    <a:defRPr sz="1000" b="1" i="0" u="none" strike="noStrike" kern="1200" spc="0" baseline="0">
-                      <a:solidFill>
-                        <a:schemeClr val="accent3">
-                          <a:lumMod val="60000"/>
-                        </a:schemeClr>
-                      </a:solidFill>
-                      <a:latin typeface="+mn-lt"/>
-                      <a:ea typeface="+mn-ea"/>
-                      <a:cs typeface="+mn-cs"/>
-                    </a:defRPr>
-                  </a:pPr>
-                  <a:endParaRPr lang="en-US"/>
-                </a:p>
-              </c:txPr>
-              <c:dLblPos val="bestFit"/>
-              <c:showLegendKey val="0"/>
-              <c:showVal val="0"/>
-              <c:showCatName val="1"/>
-              <c:showSerName val="0"/>
-              <c:showPercent val="1"/>
-              <c:showBubbleSize val="0"/>
-              <c:extLst>
-                <c:ext xmlns:c15="http://schemas.microsoft.com/office/drawing/2012/chart" uri="{CE6537A1-D6FC-4f65-9D91-7224C49458BB}"/>
-                <c:ext xmlns:c16="http://schemas.microsoft.com/office/drawing/2014/chart" uri="{C3380CC4-5D6E-409C-BE32-E72D297353CC}">
-                  <c16:uniqueId val="{00000011-25FE-4BEA-A144-51BEC28A0A36}"/>
-                </c:ext>
-              </c:extLst>
-            </c:dLbl>
-            <c:dLbl>
-              <c:idx val="9"/>
-              <c:numFmt formatCode="0.0%" sourceLinked="0"/>
-              <c:spPr>
-                <a:noFill/>
-                <a:ln>
-                  <a:noFill/>
-                </a:ln>
-                <a:effectLst/>
-              </c:spPr>
-              <c:txPr>
-                <a:bodyPr rot="0" spcFirstLastPara="1" vertOverflow="ellipsis" vert="horz" wrap="square" lIns="38100" tIns="19050" rIns="38100" bIns="19050" anchor="ctr" anchorCtr="1">
-                  <a:spAutoFit/>
-                </a:bodyPr>
-                <a:lstStyle/>
-                <a:p>
-                  <a:pPr>
-                    <a:defRPr sz="1000" b="1" i="0" u="none" strike="noStrike" kern="1200" spc="0" baseline="0">
-                      <a:solidFill>
-                        <a:schemeClr val="accent1"/>
-                      </a:solidFill>
-                      <a:latin typeface="+mn-lt"/>
-                      <a:ea typeface="+mn-ea"/>
-                      <a:cs typeface="+mn-cs"/>
-                    </a:defRPr>
-                  </a:pPr>
-                  <a:endParaRPr lang="en-US"/>
-                </a:p>
-              </c:txPr>
-              <c:dLblPos val="outEnd"/>
-              <c:showLegendKey val="0"/>
-              <c:showVal val="0"/>
-              <c:showCatName val="1"/>
-              <c:showSerName val="0"/>
-              <c:showPercent val="1"/>
-              <c:showBubbleSize val="0"/>
-              <c:extLst>
-                <c:ext xmlns:c16="http://schemas.microsoft.com/office/drawing/2014/chart" uri="{C3380CC4-5D6E-409C-BE32-E72D297353CC}">
-                  <c16:uniqueId val="{00000013-25FE-4BEA-A144-51BEC28A0A36}"/>
-                </c:ext>
-              </c:extLst>
-            </c:dLbl>
-            <c:dLbl>
-              <c:idx val="10"/>
-              <c:numFmt formatCode="0.0%" sourceLinked="0"/>
-              <c:spPr>
-                <a:noFill/>
-                <a:ln>
-                  <a:noFill/>
-                </a:ln>
-                <a:effectLst/>
-              </c:spPr>
-              <c:txPr>
-                <a:bodyPr rot="0" spcFirstLastPara="1" vertOverflow="ellipsis" vert="horz" wrap="square" lIns="38100" tIns="19050" rIns="38100" bIns="19050" anchor="ctr" anchorCtr="1">
-                  <a:spAutoFit/>
-                </a:bodyPr>
-                <a:lstStyle/>
-                <a:p>
-                  <a:pPr>
-                    <a:defRPr sz="1000" b="1" i="0" u="none" strike="noStrike" kern="1200" spc="0" baseline="0">
-                      <a:solidFill>
-                        <a:schemeClr val="accent5">
-                          <a:lumMod val="60000"/>
-                        </a:schemeClr>
-                      </a:solidFill>
-                      <a:latin typeface="+mn-lt"/>
-                      <a:ea typeface="+mn-ea"/>
-                      <a:cs typeface="+mn-cs"/>
-                    </a:defRPr>
-                  </a:pPr>
-                  <a:endParaRPr lang="en-US"/>
-                </a:p>
-              </c:txPr>
-              <c:dLblPos val="outEnd"/>
-              <c:showLegendKey val="0"/>
-              <c:showVal val="0"/>
-              <c:showCatName val="1"/>
-              <c:showSerName val="0"/>
-              <c:showPercent val="1"/>
-              <c:showBubbleSize val="0"/>
-              <c:extLst>
-                <c:ext xmlns:c16="http://schemas.microsoft.com/office/drawing/2014/chart" uri="{C3380CC4-5D6E-409C-BE32-E72D297353CC}">
-                  <c16:uniqueId val="{00000015-25FE-4BEA-A144-51BEC28A0A36}"/>
-                </c:ext>
-              </c:extLst>
-            </c:dLbl>
-            <c:dLbl>
-              <c:idx val="11"/>
-              <c:layout>
-                <c:manualLayout>
-                  <c:x val="-1.2844221758953445E-16"/>
-                  <c:y val="5.048254201929233E-2"/>
-                </c:manualLayout>
-              </c:layout>
-              <c:numFmt formatCode="0.00%" sourceLinked="0"/>
-              <c:spPr>
-                <a:noFill/>
-                <a:ln>
-                  <a:noFill/>
-                </a:ln>
-                <a:effectLst/>
-              </c:spPr>
-              <c:txPr>
-                <a:bodyPr rot="0" spcFirstLastPara="1" vertOverflow="ellipsis" vert="horz" wrap="square" lIns="38100" tIns="19050" rIns="38100" bIns="19050" anchor="ctr" anchorCtr="1">
-                  <a:spAutoFit/>
-                </a:bodyPr>
-                <a:lstStyle/>
-                <a:p>
-                  <a:pPr>
-                    <a:defRPr sz="1000" b="1" i="0" u="none" strike="noStrike" kern="1200" spc="0" baseline="0">
-                      <a:solidFill>
-                        <a:schemeClr val="accent6">
-                          <a:lumMod val="60000"/>
-                        </a:schemeClr>
-                      </a:solidFill>
-                      <a:latin typeface="+mn-lt"/>
-                      <a:ea typeface="+mn-ea"/>
-                      <a:cs typeface="+mn-cs"/>
-                    </a:defRPr>
-                  </a:pPr>
-                  <a:endParaRPr lang="en-US"/>
-                </a:p>
-              </c:txPr>
-              <c:dLblPos val="bestFit"/>
-              <c:showLegendKey val="0"/>
-              <c:showVal val="0"/>
-              <c:showCatName val="1"/>
-              <c:showSerName val="0"/>
-              <c:showPercent val="1"/>
-              <c:showBubbleSize val="0"/>
-              <c:extLst>
-                <c:ext xmlns:c15="http://schemas.microsoft.com/office/drawing/2012/chart" uri="{CE6537A1-D6FC-4f65-9D91-7224C49458BB}"/>
-                <c:ext xmlns:c16="http://schemas.microsoft.com/office/drawing/2014/chart" uri="{C3380CC4-5D6E-409C-BE32-E72D297353CC}">
-                  <c16:uniqueId val="{00000017-25FE-4BEA-A144-51BEC28A0A36}"/>
-                </c:ext>
-              </c:extLst>
-            </c:dLbl>
-            <c:dLbl>
-              <c:idx val="12"/>
-              <c:tx>
-                <c:rich>
-                  <a:bodyPr rot="0" spcFirstLastPara="1" vertOverflow="ellipsis" vert="horz" wrap="square" lIns="38100" tIns="19050" rIns="38100" bIns="19050" anchor="ctr" anchorCtr="1">
-                    <a:spAutoFit/>
-                  </a:bodyPr>
-                  <a:lstStyle/>
-                  <a:p>
-                    <a:pPr>
-                      <a:defRPr sz="1000" b="1" i="0" u="none" strike="noStrike" kern="1200" spc="0" baseline="0">
-                        <a:solidFill>
-                          <a:schemeClr val="accent1"/>
-                        </a:solidFill>
-                        <a:latin typeface="+mn-lt"/>
-                        <a:ea typeface="+mn-ea"/>
-                        <a:cs typeface="+mn-cs"/>
-                      </a:defRPr>
-                    </a:pPr>
-                    <a:r>
-                      <a:rPr lang="en-US"/>
-                      <a:t>SlicerIGT</a:t>
-                    </a:r>
-                    <a:r>
-                      <a:rPr lang="en-US" baseline="0"/>
-                      <a:t>
-</a:t>
-                    </a:r>
-                    <a:fld id="{5189FB41-81C0-4CD6-9C3C-D104B4C06E7D}" type="PERCENTAGE">
-                      <a:rPr lang="en-US" baseline="0"/>
-                      <a:pPr>
-                        <a:defRPr>
-                          <a:solidFill>
-                            <a:schemeClr val="accent1"/>
-                          </a:solidFill>
-                        </a:defRPr>
-                      </a:pPr>
-                      <a:t>[PERCENTAGE]</a:t>
-                    </a:fld>
-                    <a:endParaRPr lang="en-US" baseline="0"/>
-                  </a:p>
-                </c:rich>
-              </c:tx>
-              <c:numFmt formatCode="0.0%" sourceLinked="0"/>
-              <c:spPr>
-                <a:noFill/>
-                <a:ln>
-                  <a:noFill/>
-                </a:ln>
-                <a:effectLst/>
-              </c:spPr>
-              <c:txPr>
-                <a:bodyPr rot="0" spcFirstLastPara="1" vertOverflow="ellipsis" vert="horz" wrap="square" lIns="38100" tIns="19050" rIns="38100" bIns="19050" anchor="ctr" anchorCtr="1">
-                  <a:spAutoFit/>
-                </a:bodyPr>
-                <a:lstStyle/>
-                <a:p>
-                  <a:pPr>
-                    <a:defRPr sz="1000" b="1" i="0" u="none" strike="noStrike" kern="1200" spc="0" baseline="0">
-                      <a:solidFill>
-                        <a:schemeClr val="accent1"/>
-                      </a:solidFill>
-                      <a:latin typeface="+mn-lt"/>
-                      <a:ea typeface="+mn-ea"/>
-                      <a:cs typeface="+mn-cs"/>
-                    </a:defRPr>
-                  </a:pPr>
-                  <a:endParaRPr lang="en-US"/>
-                </a:p>
-              </c:txPr>
-              <c:dLblPos val="outEnd"/>
-              <c:showLegendKey val="0"/>
-              <c:showVal val="0"/>
-              <c:showCatName val="1"/>
-              <c:showSerName val="0"/>
-              <c:showPercent val="1"/>
-              <c:showBubbleSize val="0"/>
-              <c:extLst>
-                <c:ext xmlns:c15="http://schemas.microsoft.com/office/drawing/2012/chart" uri="{CE6537A1-D6FC-4f65-9D91-7224C49458BB}">
-                  <c15:dlblFieldTable/>
-                  <c15:showDataLabelsRange val="0"/>
-                </c:ext>
-                <c:ext xmlns:c16="http://schemas.microsoft.com/office/drawing/2014/chart" uri="{C3380CC4-5D6E-409C-BE32-E72D297353CC}">
-                  <c16:uniqueId val="{00000019-25FE-4BEA-A144-51BEC28A0A36}"/>
-                </c:ext>
-              </c:extLst>
-            </c:dLbl>
-            <c:numFmt formatCode="0.0%" sourceLinked="0"/>
-            <c:spPr>
-              <a:noFill/>
-              <a:ln>
-                <a:noFill/>
-              </a:ln>
-              <a:effectLst/>
-            </c:spPr>
-            <c:dLblPos val="outEnd"/>
-            <c:showLegendKey val="0"/>
-            <c:showVal val="0"/>
-            <c:showCatName val="1"/>
-            <c:showSerName val="0"/>
-            <c:showPercent val="1"/>
-            <c:showBubbleSize val="0"/>
-            <c:showLeaderLines val="1"/>
-            <c:leaderLines>
-              <c:spPr>
-                <a:ln w="9525" cap="flat" cmpd="sng" algn="ctr">
-                  <a:solidFill>
-                    <a:schemeClr val="tx1">
-                      <a:lumMod val="35000"/>
-                      <a:lumOff val="65000"/>
-                    </a:schemeClr>
-                  </a:solidFill>
-                  <a:round/>
-                </a:ln>
-                <a:effectLst/>
-              </c:spPr>
-            </c:leaderLines>
-            <c:extLst>
-              <c:ext xmlns:c15="http://schemas.microsoft.com/office/drawing/2012/chart" uri="{CE6537A1-D6FC-4f65-9D91-7224C49458BB}"/>
-            </c:extLst>
-          </c:dLbls>
-          <c:cat>
-            <c:strRef>
-              <c:f>Sheet1!$A$2:$A$13</c:f>
-              <c:strCache>
-                <c:ptCount val="12"/>
-                <c:pt idx="0">
-                  <c:v>BrainsTools ext</c:v>
-                </c:pt>
-                <c:pt idx="1">
-                  <c:v>Qt</c:v>
-                </c:pt>
-                <c:pt idx="2">
-                  <c:v>VTK</c:v>
-                </c:pt>
-                <c:pt idx="3">
-                  <c:v>ITK</c:v>
-                </c:pt>
-                <c:pt idx="4">
-                  <c:v>Python</c:v>
-                </c:pt>
-                <c:pt idx="5">
-                  <c:v>Numpy</c:v>
-                </c:pt>
-                <c:pt idx="6">
-                  <c:v>DCMTK</c:v>
-                </c:pt>
-                <c:pt idx="7">
-                  <c:v>3DSlicer core</c:v>
-                </c:pt>
-                <c:pt idx="8">
-                  <c:v>CTK</c:v>
-                </c:pt>
-                <c:pt idx="9">
-                  <c:v>Plus toolkit</c:v>
-                </c:pt>
-                <c:pt idx="10">
-                  <c:v>SlicerIGT ext</c:v>
-                </c:pt>
-                <c:pt idx="11">
-                  <c:v>LumpNav ext</c:v>
-                </c:pt>
-              </c:strCache>
-            </c:strRef>
-          </c:cat>
-          <c:val>
-            <c:numRef>
-              <c:f>Sheet1!$B$2:$B$13</c:f>
-              <c:numCache>
-                <c:formatCode>General</c:formatCode>
-                <c:ptCount val="12"/>
-                <c:pt idx="0">
-                  <c:v>133781</c:v>
-                </c:pt>
-                <c:pt idx="1">
-                  <c:v>2994503</c:v>
-                </c:pt>
-                <c:pt idx="2">
-                  <c:v>2827045</c:v>
-                </c:pt>
-                <c:pt idx="3">
-                  <c:v>1346552</c:v>
-                </c:pt>
-                <c:pt idx="4">
-                  <c:v>1009347</c:v>
-                </c:pt>
-                <c:pt idx="5">
-                  <c:v>700557</c:v>
-                </c:pt>
-                <c:pt idx="6">
-                  <c:v>535127</c:v>
-                </c:pt>
-                <c:pt idx="7">
-                  <c:v>354397</c:v>
-                </c:pt>
-                <c:pt idx="8">
-                  <c:v>173658</c:v>
-                </c:pt>
-                <c:pt idx="9">
-                  <c:v>146855</c:v>
-                </c:pt>
-                <c:pt idx="10">
-                  <c:v>18645</c:v>
-                </c:pt>
-                <c:pt idx="11">
-                  <c:v>1428</c:v>
-                </c:pt>
-              </c:numCache>
-            </c:numRef>
-          </c:val>
-          <c:extLst>
-            <c:ext xmlns:c16="http://schemas.microsoft.com/office/drawing/2014/chart" uri="{C3380CC4-5D6E-409C-BE32-E72D297353CC}">
-              <c16:uniqueId val="{0000001A-25FE-4BEA-A144-51BEC28A0A36}"/>
-            </c:ext>
-          </c:extLst>
-        </c:ser>
-        <c:dLbls>
-          <c:dLblPos val="outEnd"/>
-          <c:showLegendKey val="0"/>
-          <c:showVal val="0"/>
-          <c:showCatName val="1"/>
-          <c:showSerName val="0"/>
-          <c:showPercent val="0"/>
-          <c:showBubbleSize val="0"/>
-          <c:showLeaderLines val="1"/>
-        </c:dLbls>
-        <c:gapWidth val="252"/>
-        <c:splitType val="pos"/>
-        <c:splitPos val="3"/>
-        <c:secondPieSize val="85"/>
-        <c:serLines>
-          <c:spPr>
-            <a:ln w="9525" cap="flat" cmpd="sng" algn="ctr">
-              <a:solidFill>
-                <a:schemeClr val="tx1">
-                  <a:lumMod val="35000"/>
-                  <a:lumOff val="65000"/>
-                </a:schemeClr>
-              </a:solidFill>
-              <a:round/>
-            </a:ln>
-            <a:effectLst/>
-          </c:spPr>
-        </c:serLines>
-      </c:ofPieChart>
-      <c:spPr>
-        <a:noFill/>
-        <a:ln>
-          <a:noFill/>
-        </a:ln>
-        <a:effectLst/>
-      </c:spPr>
-    </c:plotArea>
-    <c:plotVisOnly val="1"/>
-    <c:dispBlanksAs val="gap"/>
-    <c:showDLblsOverMax val="0"/>
-  </c:chart>
-  <c:spPr>
-    <a:noFill/>
-    <a:ln>
-      <a:noFill/>
-    </a:ln>
-    <a:effectLst/>
-  </c:spPr>
-  <c:txPr>
-    <a:bodyPr/>
-    <a:lstStyle/>
-    <a:p>
-      <a:pPr>
-        <a:defRPr/>
-      </a:pPr>
-      <a:endParaRPr lang="en-US"/>
-    </a:p>
-  </c:txPr>
-  <c:externalData r:id="rId3">
-    <c:autoUpdate val="0"/>
-  </c:externalData>
-</c:chartSpace>
-</file>
-
-<file path=ppt/charts/colors1.xml><?xml version="1.0" encoding="utf-8"?>
-<cs:colorStyle xmlns:cs="http://schemas.microsoft.com/office/drawing/2012/chartStyle" xmlns:a="http://schemas.openxmlformats.org/drawingml/2006/main" meth="cycle" id="10">
-  <a:schemeClr val="accent1"/>
-  <a:schemeClr val="accent2"/>
-  <a:schemeClr val="accent3"/>
-  <a:schemeClr val="accent4"/>
-  <a:schemeClr val="accent5"/>
-  <a:schemeClr val="accent6"/>
-  <cs:variation/>
-  <cs:variation>
-    <a:lumMod val="60000"/>
-  </cs:variation>
-  <cs:variation>
-    <a:lumMod val="80000"/>
-    <a:lumOff val="20000"/>
-  </cs:variation>
-  <cs:variation>
-    <a:lumMod val="80000"/>
-  </cs:variation>
-  <cs:variation>
-    <a:lumMod val="60000"/>
-    <a:lumOff val="40000"/>
-  </cs:variation>
-  <cs:variation>
-    <a:lumMod val="50000"/>
-  </cs:variation>
-  <cs:variation>
-    <a:lumMod val="70000"/>
-    <a:lumOff val="30000"/>
-  </cs:variation>
-  <cs:variation>
-    <a:lumMod val="70000"/>
-  </cs:variation>
-  <cs:variation>
-    <a:lumMod val="50000"/>
-    <a:lumOff val="50000"/>
-  </cs:variation>
-</cs:colorStyle>
-</file>
-
-<file path=ppt/charts/style1.xml><?xml version="1.0" encoding="utf-8"?>
-<cs:chartStyle xmlns:cs="http://schemas.microsoft.com/office/drawing/2012/chartStyle" xmlns:a="http://schemas.openxmlformats.org/drawingml/2006/main" id="259">
-  <cs:axisTitle>
-    <cs:lnRef idx="0"/>
-    <cs:fillRef idx="0"/>
-    <cs:effectRef idx="0"/>
-    <cs:fontRef idx="minor">
-      <a:schemeClr val="tx1">
-        <a:lumMod val="65000"/>
-        <a:lumOff val="35000"/>
-      </a:schemeClr>
-    </cs:fontRef>
-    <cs:defRPr sz="900" kern="1200" cap="all"/>
-  </cs:axisTitle>
-  <cs:categoryAxis>
-    <cs:lnRef idx="0"/>
-    <cs:fillRef idx="0"/>
-    <cs:effectRef idx="0"/>
-    <cs:fontRef idx="minor">
-      <a:schemeClr val="tx1">
-        <a:lumMod val="65000"/>
-        <a:lumOff val="35000"/>
-      </a:schemeClr>
-    </cs:fontRef>
-    <cs:defRPr sz="900" kern="1200"/>
-  </cs:categoryAxis>
-  <cs:chartArea mods="allowNoFillOverride allowNoLineOverride">
-    <cs:lnRef idx="0"/>
-    <cs:fillRef idx="0"/>
-    <cs:effectRef idx="0"/>
-    <cs:fontRef idx="minor">
-      <a:schemeClr val="tx1"/>
-    </cs:fontRef>
-    <cs:spPr>
-      <a:solidFill>
-        <a:schemeClr val="bg1"/>
-      </a:solidFill>
-      <a:ln w="9525" cap="flat" cmpd="sng" algn="ctr">
-        <a:solidFill>
-          <a:schemeClr val="tx1">
-            <a:lumMod val="15000"/>
-            <a:lumOff val="85000"/>
-          </a:schemeClr>
-        </a:solidFill>
-        <a:round/>
-      </a:ln>
-    </cs:spPr>
-    <cs:defRPr sz="1000" kern="1200"/>
-  </cs:chartArea>
-  <cs:dataLabel>
-    <cs:lnRef idx="0"/>
-    <cs:fillRef idx="0"/>
-    <cs:effectRef idx="0"/>
-    <cs:fontRef idx="minor">
-      <cs:styleClr val="auto"/>
-    </cs:fontRef>
-    <cs:defRPr sz="1000" b="1" i="0" u="none" strike="noStrike" kern="1200" spc="0" baseline="0"/>
-  </cs:dataLabel>
-  <cs:dataLabelCallout>
-    <cs:lnRef idx="0">
-      <cs:styleClr val="auto"/>
-    </cs:lnRef>
-    <cs:fillRef idx="0"/>
-    <cs:effectRef idx="0"/>
-    <cs:fontRef idx="minor">
-      <cs:styleClr val="auto"/>
-    </cs:fontRef>
-    <cs:spPr>
-      <a:solidFill>
-        <a:schemeClr val="lt1"/>
-      </a:solidFill>
-      <a:ln>
-        <a:solidFill>
-          <a:schemeClr val="phClr"/>
-        </a:solidFill>
-      </a:ln>
-    </cs:spPr>
-    <cs:defRPr sz="1000" b="1" kern="1200"/>
-    <cs:bodyPr rot="0" spcFirstLastPara="1" vertOverflow="clip" horzOverflow="clip" vert="horz" wrap="square" lIns="36576" tIns="18288" rIns="36576" bIns="18288" anchor="ctr" anchorCtr="1">
-      <a:spAutoFit/>
-    </cs:bodyPr>
-  </cs:dataLabelCallout>
-  <cs:dataPoint>
-    <cs:lnRef idx="0"/>
-    <cs:fillRef idx="0">
-      <cs:styleClr val="auto"/>
-    </cs:fillRef>
-    <cs:effectRef idx="0"/>
-    <cs:fontRef idx="minor">
-      <a:schemeClr val="dk1"/>
-    </cs:fontRef>
-    <cs:spPr>
-      <a:solidFill>
-        <a:schemeClr val="phClr"/>
-      </a:solidFill>
-      <a:effectLst>
-        <a:outerShdw blurRad="63500" sx="102000" sy="102000" algn="ctr" rotWithShape="0">
-          <a:prstClr val="black">
-            <a:alpha val="20000"/>
-          </a:prstClr>
-        </a:outerShdw>
-      </a:effectLst>
-    </cs:spPr>
-  </cs:dataPoint>
-  <cs:dataPoint3D>
-    <cs:lnRef idx="0"/>
-    <cs:fillRef idx="0">
-      <cs:styleClr val="auto"/>
-    </cs:fillRef>
-    <cs:effectRef idx="0"/>
-    <cs:fontRef idx="minor">
-      <a:schemeClr val="dk1"/>
-    </cs:fontRef>
-    <cs:spPr>
-      <a:solidFill>
-        <a:schemeClr val="phClr"/>
-      </a:solidFill>
-      <a:effectLst>
-        <a:outerShdw blurRad="88900" sx="102000" sy="102000" algn="ctr" rotWithShape="0">
-          <a:prstClr val="black">
-            <a:alpha val="10000"/>
-          </a:prstClr>
-        </a:outerShdw>
-      </a:effectLst>
-      <a:scene3d>
-        <a:camera prst="orthographicFront"/>
-        <a:lightRig rig="threePt" dir="t"/>
-      </a:scene3d>
-      <a:sp3d>
-        <a:bevelT w="127000" h="127000"/>
-        <a:bevelB w="127000" h="127000"/>
-      </a:sp3d>
-    </cs:spPr>
-  </cs:dataPoint3D>
-  <cs:dataPointLine>
-    <cs:lnRef idx="0">
-      <cs:styleClr val="auto"/>
-    </cs:lnRef>
-    <cs:fillRef idx="0"/>
-    <cs:effectRef idx="0"/>
-    <cs:fontRef idx="minor">
-      <a:schemeClr val="dk1"/>
-    </cs:fontRef>
-    <cs:spPr>
-      <a:ln w="28575" cap="rnd">
-        <a:solidFill>
-          <a:schemeClr val="phClr"/>
-        </a:solidFill>
-        <a:round/>
-      </a:ln>
-    </cs:spPr>
-  </cs:dataPointLine>
-  <cs:dataPointMarker>
-    <cs:lnRef idx="0"/>
-    <cs:fillRef idx="0">
-      <cs:styleClr val="auto"/>
-    </cs:fillRef>
-    <cs:effectRef idx="0"/>
-    <cs:fontRef idx="minor">
-      <a:schemeClr val="dk1"/>
-    </cs:fontRef>
-    <cs:spPr>
-      <a:solidFill>
-        <a:schemeClr val="phClr"/>
-      </a:solidFill>
-      <a:ln w="9525">
-        <a:solidFill>
-          <a:schemeClr val="lt1"/>
-        </a:solidFill>
-      </a:ln>
-    </cs:spPr>
-  </cs:dataPointMarker>
-  <cs:dataPointMarkerLayout symbol="circle" size="6"/>
-  <cs:dataPointWireframe>
-    <cs:lnRef idx="0">
-      <cs:styleClr val="auto"/>
-    </cs:lnRef>
-    <cs:fillRef idx="0"/>
-    <cs:effectRef idx="0"/>
-    <cs:fontRef idx="minor">
-      <a:schemeClr val="dk1"/>
-    </cs:fontRef>
-    <cs:spPr>
-      <a:ln w="9525" cap="rnd">
-        <a:solidFill>
-          <a:schemeClr val="phClr"/>
-        </a:solidFill>
-        <a:round/>
-      </a:ln>
-    </cs:spPr>
-  </cs:dataPointWireframe>
-  <cs:dataTable>
-    <cs:lnRef idx="0"/>
-    <cs:fillRef idx="0"/>
-    <cs:effectRef idx="0"/>
-    <cs:fontRef idx="minor">
-      <a:schemeClr val="tx1">
-        <a:lumMod val="65000"/>
-        <a:lumOff val="35000"/>
-      </a:schemeClr>
-    </cs:fontRef>
-    <cs:spPr>
-      <a:noFill/>
-      <a:ln w="9525" cap="flat" cmpd="sng" algn="ctr">
-        <a:solidFill>
-          <a:schemeClr val="tx1">
-            <a:lumMod val="15000"/>
-            <a:lumOff val="85000"/>
-          </a:schemeClr>
-        </a:solidFill>
-        <a:round/>
-      </a:ln>
-    </cs:spPr>
-    <cs:defRPr sz="900" kern="1200"/>
-  </cs:dataTable>
-  <cs:downBar>
-    <cs:lnRef idx="0"/>
-    <cs:fillRef idx="0"/>
-    <cs:effectRef idx="0"/>
-    <cs:fontRef idx="minor">
-      <a:schemeClr val="tx1"/>
-    </cs:fontRef>
-    <cs:spPr>
-      <a:solidFill>
-        <a:schemeClr val="dk1">
-          <a:lumMod val="75000"/>
-          <a:lumOff val="25000"/>
-        </a:schemeClr>
-      </a:solidFill>
-      <a:ln w="9525" cap="flat" cmpd="sng" algn="ctr">
-        <a:solidFill>
-          <a:schemeClr val="tx1">
-            <a:lumMod val="65000"/>
-            <a:lumOff val="35000"/>
-          </a:schemeClr>
-        </a:solidFill>
-        <a:round/>
-      </a:ln>
-    </cs:spPr>
-  </cs:downBar>
-  <cs:dropLine>
-    <cs:lnRef idx="0"/>
-    <cs:fillRef idx="0"/>
-    <cs:effectRef idx="0"/>
-    <cs:fontRef idx="minor">
-      <a:schemeClr val="tx1"/>
-    </cs:fontRef>
-    <cs:spPr>
-      <a:ln w="9525" cap="flat" cmpd="sng" algn="ctr">
-        <a:solidFill>
-          <a:schemeClr val="tx1">
-            <a:lumMod val="35000"/>
-            <a:lumOff val="65000"/>
-          </a:schemeClr>
-        </a:solidFill>
-        <a:round/>
-      </a:ln>
-    </cs:spPr>
-  </cs:dropLine>
-  <cs:errorBar>
-    <cs:lnRef idx="0"/>
-    <cs:fillRef idx="0"/>
-    <cs:effectRef idx="0"/>
-    <cs:fontRef idx="minor">
-      <a:schemeClr val="tx1"/>
-    </cs:fontRef>
-    <cs:spPr>
-      <a:ln w="9525" cap="flat" cmpd="sng" algn="ctr">
-        <a:solidFill>
-          <a:schemeClr val="tx1">
-            <a:lumMod val="65000"/>
-            <a:lumOff val="35000"/>
-          </a:schemeClr>
-        </a:solidFill>
-        <a:round/>
-      </a:ln>
-    </cs:spPr>
-  </cs:errorBar>
-  <cs:floor>
-    <cs:lnRef idx="0"/>
-    <cs:fillRef idx="0"/>
-    <cs:effectRef idx="0"/>
-    <cs:fontRef idx="minor">
-      <a:schemeClr val="tx1"/>
-    </cs:fontRef>
-    <cs:spPr>
-      <a:noFill/>
-      <a:ln>
-        <a:noFill/>
-      </a:ln>
-    </cs:spPr>
-  </cs:floor>
-  <cs:gridlineMajor>
-    <cs:lnRef idx="0"/>
-    <cs:fillRef idx="0"/>
-    <cs:effectRef idx="0"/>
-    <cs:fontRef idx="minor">
-      <a:schemeClr val="tx1"/>
-    </cs:fontRef>
-    <cs:spPr>
-      <a:ln w="9525" cap="flat" cmpd="sng" algn="ctr">
-        <a:solidFill>
-          <a:schemeClr val="tx1">
-            <a:lumMod val="15000"/>
-            <a:lumOff val="85000"/>
-          </a:schemeClr>
-        </a:solidFill>
-        <a:round/>
-      </a:ln>
-    </cs:spPr>
-  </cs:gridlineMajor>
-  <cs:gridlineMinor>
-    <cs:lnRef idx="0"/>
-    <cs:fillRef idx="0"/>
-    <cs:effectRef idx="0"/>
-    <cs:fontRef idx="minor">
-      <a:schemeClr val="tx1"/>
-    </cs:fontRef>
-    <cs:spPr>
-      <a:ln w="9525" cap="flat" cmpd="sng" algn="ctr">
-        <a:solidFill>
-          <a:schemeClr val="tx1">
-            <a:lumMod val="5000"/>
-            <a:lumOff val="95000"/>
-          </a:schemeClr>
-        </a:solidFill>
-        <a:round/>
-      </a:ln>
-    </cs:spPr>
-  </cs:gridlineMinor>
-  <cs:hiLoLine>
-    <cs:lnRef idx="0"/>
-    <cs:fillRef idx="0"/>
-    <cs:effectRef idx="0"/>
-    <cs:fontRef idx="minor">
-      <a:schemeClr val="tx1"/>
-    </cs:fontRef>
-    <cs:spPr>
-      <a:ln w="9525" cap="flat" cmpd="sng" algn="ctr">
-        <a:solidFill>
-          <a:schemeClr val="tx1">
-            <a:lumMod val="50000"/>
-            <a:lumOff val="50000"/>
-          </a:schemeClr>
-        </a:solidFill>
-        <a:round/>
-      </a:ln>
-    </cs:spPr>
-  </cs:hiLoLine>
-  <cs:leaderLine>
-    <cs:lnRef idx="0"/>
-    <cs:fillRef idx="0"/>
-    <cs:effectRef idx="0"/>
-    <cs:fontRef idx="minor">
-      <a:schemeClr val="tx1"/>
-    </cs:fontRef>
-    <cs:spPr>
-      <a:ln w="9525" cap="flat" cmpd="sng" algn="ctr">
-        <a:solidFill>
-          <a:schemeClr val="tx1">
-            <a:lumMod val="35000"/>
-            <a:lumOff val="65000"/>
-          </a:schemeClr>
-        </a:solidFill>
-        <a:round/>
-      </a:ln>
-    </cs:spPr>
-  </cs:leaderLine>
-  <cs:legend>
-    <cs:lnRef idx="0"/>
-    <cs:fillRef idx="0"/>
-    <cs:effectRef idx="0"/>
-    <cs:fontRef idx="minor">
-      <a:schemeClr val="tx1">
-        <a:lumMod val="65000"/>
-        <a:lumOff val="35000"/>
-      </a:schemeClr>
-    </cs:fontRef>
-    <cs:defRPr sz="900" kern="1200"/>
-  </cs:legend>
-  <cs:plotArea mods="allowNoFillOverride allowNoLineOverride">
-    <cs:lnRef idx="0"/>
-    <cs:fillRef idx="0"/>
-    <cs:effectRef idx="0"/>
-    <cs:fontRef idx="minor">
-      <a:schemeClr val="dk1"/>
-    </cs:fontRef>
-  </cs:plotArea>
-  <cs:plotArea3D mods="allowNoFillOverride allowNoLineOverride">
-    <cs:lnRef idx="0"/>
-    <cs:fillRef idx="0"/>
-    <cs:effectRef idx="0"/>
-    <cs:fontRef idx="minor">
-      <a:schemeClr val="dk1"/>
-    </cs:fontRef>
-  </cs:plotArea3D>
-  <cs:seriesAxis>
-    <cs:lnRef idx="0"/>
-    <cs:fillRef idx="0"/>
-    <cs:effectRef idx="0"/>
-    <cs:fontRef idx="minor">
-      <a:schemeClr val="tx1">
-        <a:lumMod val="65000"/>
-        <a:lumOff val="35000"/>
-      </a:schemeClr>
-    </cs:fontRef>
-    <cs:defRPr sz="900" kern="1200"/>
-  </cs:seriesAxis>
-  <cs:seriesLine>
-    <cs:lnRef idx="0"/>
-    <cs:fillRef idx="0"/>
-    <cs:effectRef idx="0"/>
-    <cs:fontRef idx="minor">
-      <a:schemeClr val="tx1"/>
-    </cs:fontRef>
-    <cs:spPr>
-      <a:ln w="9525" cap="flat" cmpd="sng" algn="ctr">
-        <a:solidFill>
-          <a:schemeClr val="tx1">
-            <a:lumMod val="35000"/>
-            <a:lumOff val="65000"/>
-          </a:schemeClr>
-        </a:solidFill>
-        <a:round/>
-      </a:ln>
-    </cs:spPr>
-  </cs:seriesLine>
-  <cs:title>
-    <cs:lnRef idx="0"/>
-    <cs:fillRef idx="0"/>
-    <cs:effectRef idx="0"/>
-    <cs:fontRef idx="minor">
-      <a:schemeClr val="tx1">
-        <a:lumMod val="65000"/>
-        <a:lumOff val="35000"/>
-      </a:schemeClr>
-    </cs:fontRef>
-    <cs:defRPr sz="1600" b="1" kern="1200" cap="all" baseline="0"/>
-  </cs:title>
-  <cs:trendline>
-    <cs:lnRef idx="0">
-      <cs:styleClr val="auto"/>
-    </cs:lnRef>
-    <cs:fillRef idx="0"/>
-    <cs:effectRef idx="0"/>
-    <cs:fontRef idx="minor">
-      <a:schemeClr val="tx1"/>
-    </cs:fontRef>
-    <cs:spPr>
-      <a:ln w="19050" cap="rnd">
-        <a:solidFill>
-          <a:schemeClr val="phClr"/>
-        </a:solidFill>
-        <a:prstDash val="sysDash"/>
-      </a:ln>
-    </cs:spPr>
-  </cs:trendline>
-  <cs:trendlineLabel>
-    <cs:lnRef idx="0"/>
-    <cs:fillRef idx="0"/>
-    <cs:effectRef idx="0"/>
-    <cs:fontRef idx="minor">
-      <a:schemeClr val="tx1">
-        <a:lumMod val="65000"/>
-        <a:lumOff val="35000"/>
-      </a:schemeClr>
-    </cs:fontRef>
-    <cs:defRPr sz="900" kern="1200"/>
-  </cs:trendlineLabel>
-  <cs:upBar>
-    <cs:lnRef idx="0"/>
-    <cs:fillRef idx="0"/>
-    <cs:effectRef idx="0"/>
-    <cs:fontRef idx="minor">
-      <a:schemeClr val="tx1"/>
-    </cs:fontRef>
-    <cs:spPr>
-      <a:solidFill>
-        <a:schemeClr val="lt1"/>
-      </a:solidFill>
-      <a:ln w="9525" cap="flat" cmpd="sng" algn="ctr">
-        <a:solidFill>
-          <a:schemeClr val="tx1">
-            <a:lumMod val="65000"/>
-            <a:lumOff val="35000"/>
-          </a:schemeClr>
-        </a:solidFill>
-        <a:round/>
-      </a:ln>
-    </cs:spPr>
-  </cs:upBar>
-  <cs:valueAxis>
-    <cs:lnRef idx="0"/>
-    <cs:fillRef idx="0"/>
-    <cs:effectRef idx="0"/>
-    <cs:fontRef idx="minor">
-      <a:schemeClr val="tx1">
-        <a:lumMod val="65000"/>
-        <a:lumOff val="35000"/>
-      </a:schemeClr>
-    </cs:fontRef>
-    <cs:defRPr sz="900" kern="1200"/>
-  </cs:valueAxis>
-  <cs:wall>
-    <cs:lnRef idx="0"/>
-    <cs:fillRef idx="0"/>
-    <cs:effectRef idx="0"/>
-    <cs:fontRef idx="minor">
-      <a:schemeClr val="tx1"/>
-    </cs:fontRef>
-    <cs:spPr>
-      <a:noFill/>
-      <a:ln>
-        <a:noFill/>
-      </a:ln>
-    </cs:spPr>
-  </cs:wall>
-</cs:chartStyle>
 </file>
 
 <file path=ppt/diagrams/colors1.xml><?xml version="1.0" encoding="utf-8"?>
@@ -4736,7 +2897,7 @@
             <a:fld id="{A6E16264-6225-448A-8F6B-37C607BF693C}" type="datetimeFigureOut">
               <a:rPr lang="en-CA" smtClean="0"/>
               <a:pPr/>
-              <a:t>2019-04-30</a:t>
+              <a:t>2019-05-01</a:t>
             </a:fld>
             <a:endParaRPr lang="en-CA"/>
           </a:p>
@@ -5090,165 +3251,6 @@
 </p:notes>
 </file>
 
-<file path=ppt/notesSlides/notesSlide10.xml><?xml version="1.0" encoding="utf-8"?>
-<p:notes xmlns:a="http://schemas.openxmlformats.org/drawingml/2006/main" xmlns:r="http://schemas.openxmlformats.org/officeDocument/2006/relationships" xmlns:p="http://schemas.openxmlformats.org/presentationml/2006/main">
-  <p:cSld>
-    <p:spTree>
-      <p:nvGrpSpPr>
-        <p:cNvPr id="1" name=""/>
-        <p:cNvGrpSpPr/>
-        <p:nvPr/>
-      </p:nvGrpSpPr>
-      <p:grpSpPr>
-        <a:xfrm>
-          <a:off x="0" y="0"/>
-          <a:ext cx="0" cy="0"/>
-          <a:chOff x="0" y="0"/>
-          <a:chExt cx="0" cy="0"/>
-        </a:xfrm>
-      </p:grpSpPr>
-      <p:sp>
-        <p:nvSpPr>
-          <p:cNvPr id="2" name="Slide Image Placeholder 1"/>
-          <p:cNvSpPr>
-            <a:spLocks noGrp="1" noRot="1" noChangeAspect="1"/>
-          </p:cNvSpPr>
-          <p:nvPr>
-            <p:ph type="sldImg"/>
-          </p:nvPr>
-        </p:nvSpPr>
-        <p:spPr/>
-      </p:sp>
-      <p:sp>
-        <p:nvSpPr>
-          <p:cNvPr id="3" name="Notes Placeholder 2"/>
-          <p:cNvSpPr>
-            <a:spLocks noGrp="1"/>
-          </p:cNvSpPr>
-          <p:nvPr>
-            <p:ph type="body" idx="1"/>
-          </p:nvPr>
-        </p:nvSpPr>
-        <p:spPr/>
-        <p:txBody>
-          <a:bodyPr/>
-          <a:lstStyle/>
-          <a:p>
-            <a:pPr marL="0" marR="0" indent="0" algn="l" defTabSz="914400" rtl="0" eaLnBrk="1" fontAlgn="auto" latinLnBrk="0" hangingPunct="1">
-              <a:lnSpc>
-                <a:spcPct val="100000"/>
-              </a:lnSpc>
-              <a:spcBef>
-                <a:spcPts val="0"/>
-              </a:spcBef>
-              <a:spcAft>
-                <a:spcPts val="0"/>
-              </a:spcAft>
-              <a:buClrTx/>
-              <a:buSzTx/>
-              <a:buFontTx/>
-              <a:buNone/>
-              <a:tabLst/>
-              <a:defRPr/>
-            </a:pPr>
-            <a:r>
-              <a:rPr lang="en-US" sz="1000" baseline="0" dirty="0"/>
-              <a:t>Using </a:t>
-            </a:r>
-            <a:r>
-              <a:rPr lang="en-US" sz="1000" baseline="0" dirty="0" err="1"/>
-              <a:t>OpenIGTLink</a:t>
-            </a:r>
-            <a:r>
-              <a:rPr lang="en-US" sz="1000" baseline="0" dirty="0"/>
-              <a:t> (which is a </a:t>
-            </a:r>
-            <a:r>
-              <a:rPr lang="en-US" sz="1000" b="0" i="0" kern="1200" dirty="0">
-                <a:solidFill>
-                  <a:schemeClr val="tx1"/>
-                </a:solidFill>
-                <a:effectLst/>
-                <a:latin typeface="+mn-lt"/>
-                <a:ea typeface="+mn-ea"/>
-                <a:cs typeface="+mn-cs"/>
-              </a:rPr>
-              <a:t>Network Interface for Image-Guided Therapy),</a:t>
-            </a:r>
-            <a:r>
-              <a:rPr lang="en-US" sz="1000" b="0" i="0" kern="1200" baseline="0" dirty="0">
-                <a:solidFill>
-                  <a:schemeClr val="tx1"/>
-                </a:solidFill>
-                <a:effectLst/>
-                <a:latin typeface="+mn-lt"/>
-                <a:ea typeface="+mn-ea"/>
-                <a:cs typeface="+mn-cs"/>
-              </a:rPr>
-              <a:t> PLUS can stream this data in real-time to 3D Slicer and can also be used for</a:t>
-            </a:r>
-            <a:r>
-              <a:rPr lang="en-US" sz="1000" baseline="0" dirty="0"/>
-              <a:t> </a:t>
-            </a:r>
-            <a:r>
-              <a:rPr lang="en-US" sz="1000" b="0" i="0" kern="1200" dirty="0">
-                <a:solidFill>
-                  <a:schemeClr val="tx1"/>
-                </a:solidFill>
-                <a:effectLst/>
-                <a:latin typeface="+mn-lt"/>
-                <a:ea typeface="+mn-ea"/>
-                <a:cs typeface="+mn-cs"/>
-              </a:rPr>
-              <a:t>pre-processing, and calibration for navigated image-guided interventions.</a:t>
-            </a:r>
-            <a:endParaRPr lang="en-US" sz="1000" baseline="0" dirty="0"/>
-          </a:p>
-        </p:txBody>
-      </p:sp>
-      <p:sp>
-        <p:nvSpPr>
-          <p:cNvPr id="4" name="Slide Number Placeholder 3"/>
-          <p:cNvSpPr>
-            <a:spLocks noGrp="1"/>
-          </p:cNvSpPr>
-          <p:nvPr>
-            <p:ph type="sldNum" sz="quarter" idx="10"/>
-          </p:nvPr>
-        </p:nvSpPr>
-        <p:spPr/>
-        <p:txBody>
-          <a:bodyPr/>
-          <a:lstStyle/>
-          <a:p>
-            <a:pPr>
-              <a:defRPr/>
-            </a:pPr>
-            <a:fld id="{7D5EC535-FC31-4244-9C64-EE05A8ED5E60}" type="slidenum">
-              <a:rPr lang="en-US" smtClean="0"/>
-              <a:pPr>
-                <a:defRPr/>
-              </a:pPr>
-              <a:t>14</a:t>
-            </a:fld>
-            <a:endParaRPr lang="en-US"/>
-          </a:p>
-        </p:txBody>
-      </p:sp>
-    </p:spTree>
-    <p:extLst>
-      <p:ext uri="{BB962C8B-B14F-4D97-AF65-F5344CB8AC3E}">
-        <p14:creationId xmlns:p14="http://schemas.microsoft.com/office/powerpoint/2010/main" val="2759014083"/>
-      </p:ext>
-    </p:extLst>
-  </p:cSld>
-  <p:clrMapOvr>
-    <a:masterClrMapping/>
-  </p:clrMapOvr>
-</p:notes>
-</file>
-
 <file path=ppt/notesSlides/notesSlide2.xml><?xml version="1.0" encoding="utf-8"?>
 <p:notes xmlns:a="http://schemas.openxmlformats.org/drawingml/2006/main" xmlns:r="http://schemas.openxmlformats.org/officeDocument/2006/relationships" xmlns:p="http://schemas.openxmlformats.org/presentationml/2006/main">
   <p:cSld>
@@ -5693,29 +3695,19 @@
       </p:grpSpPr>
       <p:sp>
         <p:nvSpPr>
-          <p:cNvPr id="33794" name="Slide Image Placeholder 1"/>
+          <p:cNvPr id="2" name="Slide Image Placeholder 1"/>
           <p:cNvSpPr>
-            <a:spLocks noGrp="1" noRot="1" noChangeAspect="1" noTextEdit="1"/>
+            <a:spLocks noGrp="1" noRot="1" noChangeAspect="1"/>
           </p:cNvSpPr>
           <p:nvPr>
             <p:ph type="sldImg"/>
           </p:nvPr>
         </p:nvSpPr>
-        <p:spPr bwMode="auto">
-          <a:noFill/>
-          <a:ln>
-            <a:solidFill>
-              <a:srgbClr val="000000"/>
-            </a:solidFill>
-            <a:miter lim="800000"/>
-            <a:headEnd/>
-            <a:tailEnd/>
-          </a:ln>
-        </p:spPr>
-      </p:sp>
-      <p:sp>
-        <p:nvSpPr>
-          <p:cNvPr id="33795" name="Notes Placeholder 2"/>
+        <p:spPr/>
+      </p:sp>
+      <p:sp>
+        <p:nvSpPr>
+          <p:cNvPr id="3" name="Notes Placeholder 2"/>
           <p:cNvSpPr>
             <a:spLocks noGrp="1"/>
           </p:cNvSpPr>
@@ -5723,164 +3715,14 @@
             <p:ph type="body" idx="1"/>
           </p:nvPr>
         </p:nvSpPr>
-        <p:spPr bwMode="auto">
-          <a:noFill/>
-        </p:spPr>
+        <p:spPr/>
         <p:txBody>
-          <a:bodyPr wrap="square" numCol="1" anchor="t" anchorCtr="0" compatLnSpc="1">
-            <a:prstTxWarp prst="textNoShape">
-              <a:avLst/>
-            </a:prstTxWarp>
+          <a:bodyPr>
+            <a:normAutofit/>
           </a:bodyPr>
           <a:lstStyle/>
           <a:p>
-            <a:pPr marL="0" marR="0" indent="0" algn="l" defTabSz="914400" rtl="0" eaLnBrk="1" fontAlgn="auto" latinLnBrk="0" hangingPunct="1">
-              <a:lnSpc>
-                <a:spcPct val="100000"/>
-              </a:lnSpc>
-              <a:spcBef>
-                <a:spcPts val="0"/>
-              </a:spcBef>
-              <a:spcAft>
-                <a:spcPts val="0"/>
-              </a:spcAft>
-              <a:buClrTx/>
-              <a:buSzTx/>
-              <a:buFontTx/>
-              <a:buNone/>
-              <a:tabLst/>
-              <a:defRPr/>
-            </a:pPr>
-            <a:r>
-              <a:rPr lang="en-CA" sz="1000" b="1" kern="1200" dirty="0">
-                <a:solidFill>
-                  <a:srgbClr val="800000"/>
-                </a:solidFill>
-                <a:latin typeface="+mn-lt"/>
-                <a:ea typeface="+mn-ea"/>
-                <a:cs typeface="+mn-cs"/>
-              </a:rPr>
-              <a:t>Because,</a:t>
-            </a:r>
-            <a:r>
-              <a:rPr lang="en-CA" sz="1000" b="1" kern="1200" baseline="0" dirty="0">
-                <a:solidFill>
-                  <a:srgbClr val="800000"/>
-                </a:solidFill>
-                <a:latin typeface="+mn-lt"/>
-                <a:ea typeface="+mn-ea"/>
-                <a:cs typeface="+mn-cs"/>
-              </a:rPr>
-              <a:t> w</a:t>
-            </a:r>
-            <a:r>
-              <a:rPr lang="en-CA" sz="1000" b="1" kern="1200" dirty="0">
-                <a:solidFill>
-                  <a:srgbClr val="800000"/>
-                </a:solidFill>
-                <a:latin typeface="+mn-lt"/>
-                <a:ea typeface="+mn-ea"/>
-                <a:cs typeface="+mn-cs"/>
-              </a:rPr>
-              <a:t>ithout an application platform</a:t>
-            </a:r>
-          </a:p>
-          <a:p>
-            <a:r>
-              <a:rPr lang="en-US" sz="1000" dirty="0"/>
-              <a:t>Show animations</a:t>
-            </a:r>
-          </a:p>
-          <a:p>
-            <a:endParaRPr lang="en-US" sz="1000" dirty="0"/>
-          </a:p>
-          <a:p>
-            <a:pPr marL="0" marR="0" indent="0" algn="l" defTabSz="914400" rtl="0" eaLnBrk="1" fontAlgn="auto" latinLnBrk="0" hangingPunct="1">
-              <a:lnSpc>
-                <a:spcPct val="100000"/>
-              </a:lnSpc>
-              <a:spcBef>
-                <a:spcPts val="0"/>
-              </a:spcBef>
-              <a:spcAft>
-                <a:spcPts val="0"/>
-              </a:spcAft>
-              <a:buClrTx/>
-              <a:buSzTx/>
-              <a:buFontTx/>
-              <a:buNone/>
-              <a:tabLst/>
-              <a:defRPr/>
-            </a:pPr>
-            <a:r>
-              <a:rPr lang="en-CA" sz="1000" b="1" kern="1200" dirty="0">
-                <a:solidFill>
-                  <a:srgbClr val="800000"/>
-                </a:solidFill>
-                <a:latin typeface="+mn-lt"/>
-                <a:ea typeface="+mn-ea"/>
-                <a:cs typeface="+mn-cs"/>
-              </a:rPr>
-              <a:t>On the other</a:t>
-            </a:r>
-            <a:r>
-              <a:rPr lang="en-CA" sz="1000" b="1" kern="1200" baseline="0" dirty="0">
-                <a:solidFill>
-                  <a:srgbClr val="800000"/>
-                </a:solidFill>
-                <a:latin typeface="+mn-lt"/>
-                <a:ea typeface="+mn-ea"/>
-                <a:cs typeface="+mn-cs"/>
-              </a:rPr>
-              <a:t> hand, if you are building your work on </a:t>
-            </a:r>
-            <a:r>
-              <a:rPr lang="en-CA" sz="1000" b="1" kern="1200" dirty="0">
-                <a:solidFill>
-                  <a:srgbClr val="800000"/>
-                </a:solidFill>
-                <a:latin typeface="+mn-lt"/>
-                <a:ea typeface="+mn-ea"/>
-                <a:cs typeface="+mn-cs"/>
-              </a:rPr>
-              <a:t>a</a:t>
-            </a:r>
-            <a:r>
-              <a:rPr lang="en-CA" sz="1000" b="1" kern="1200" baseline="0" dirty="0">
-                <a:solidFill>
-                  <a:srgbClr val="800000"/>
-                </a:solidFill>
-                <a:latin typeface="+mn-lt"/>
-                <a:ea typeface="+mn-ea"/>
-                <a:cs typeface="+mn-cs"/>
-              </a:rPr>
-              <a:t> pre-existing</a:t>
-            </a:r>
-            <a:r>
-              <a:rPr lang="en-CA" sz="1000" b="1" kern="1200" dirty="0">
-                <a:solidFill>
-                  <a:srgbClr val="800000"/>
-                </a:solidFill>
-                <a:latin typeface="+mn-lt"/>
-                <a:ea typeface="+mn-ea"/>
-                <a:cs typeface="+mn-cs"/>
-              </a:rPr>
-              <a:t> application platform</a:t>
-            </a:r>
-          </a:p>
-          <a:p>
-            <a:pPr lvl="0">
-              <a:buFont typeface="Arial" pitchFamily="34" charset="0"/>
-              <a:buNone/>
-            </a:pPr>
-            <a:r>
-              <a:rPr lang="en-CA" sz="1000" baseline="0" dirty="0"/>
-              <a:t>1. Portable (Win, Linux, Mac),  Open-source</a:t>
-            </a:r>
-            <a:endParaRPr lang="en-CA" sz="1000" dirty="0"/>
-          </a:p>
-          <a:p>
-            <a:endParaRPr lang="en-US" sz="1000" dirty="0"/>
+            <a:endParaRPr lang="en-CA" baseline="0" dirty="0"/>
           </a:p>
         </p:txBody>
       </p:sp>
@@ -5891,7 +3733,7 @@
             <a:spLocks noGrp="1"/>
           </p:cNvSpPr>
           <p:nvPr>
-            <p:ph type="sldNum" sz="quarter" idx="5"/>
+            <p:ph type="sldNum" sz="quarter" idx="10"/>
           </p:nvPr>
         </p:nvSpPr>
         <p:spPr/>
@@ -5899,14 +3741,9 @@
           <a:bodyPr/>
           <a:lstStyle/>
           <a:p>
-            <a:pPr>
-              <a:defRPr/>
-            </a:pPr>
-            <a:fld id="{7906AE71-2DEB-4313-AD57-10F20336F909}" type="slidenum">
+            <a:fld id="{1F1EA7EA-3873-4A18-AC34-55CD348F4F74}" type="slidenum">
               <a:rPr lang="en-US" smtClean="0"/>
-              <a:pPr>
-                <a:defRPr/>
-              </a:pPr>
+              <a:pPr/>
               <a:t>11</a:t>
             </a:fld>
             <a:endParaRPr lang="en-US"/>
@@ -5916,7 +3753,7 @@
     </p:spTree>
     <p:extLst>
       <p:ext uri="{BB962C8B-B14F-4D97-AF65-F5344CB8AC3E}">
-        <p14:creationId xmlns:p14="http://schemas.microsoft.com/office/powerpoint/2010/main" val="4223803756"/>
+        <p14:creationId xmlns:p14="http://schemas.microsoft.com/office/powerpoint/2010/main" val="56151519"/>
       </p:ext>
     </p:extLst>
   </p:cSld>
@@ -5967,93 +3804,6 @@
         </p:nvSpPr>
         <p:spPr/>
         <p:txBody>
-          <a:bodyPr>
-            <a:normAutofit/>
-          </a:bodyPr>
-          <a:lstStyle/>
-          <a:p>
-            <a:endParaRPr lang="en-CA" baseline="0" dirty="0"/>
-          </a:p>
-        </p:txBody>
-      </p:sp>
-      <p:sp>
-        <p:nvSpPr>
-          <p:cNvPr id="4" name="Slide Number Placeholder 3"/>
-          <p:cNvSpPr>
-            <a:spLocks noGrp="1"/>
-          </p:cNvSpPr>
-          <p:nvPr>
-            <p:ph type="sldNum" sz="quarter" idx="10"/>
-          </p:nvPr>
-        </p:nvSpPr>
-        <p:spPr/>
-        <p:txBody>
-          <a:bodyPr/>
-          <a:lstStyle/>
-          <a:p>
-            <a:fld id="{1F1EA7EA-3873-4A18-AC34-55CD348F4F74}" type="slidenum">
-              <a:rPr lang="en-US" smtClean="0"/>
-              <a:pPr/>
-              <a:t>12</a:t>
-            </a:fld>
-            <a:endParaRPr lang="en-US"/>
-          </a:p>
-        </p:txBody>
-      </p:sp>
-    </p:spTree>
-    <p:extLst>
-      <p:ext uri="{BB962C8B-B14F-4D97-AF65-F5344CB8AC3E}">
-        <p14:creationId xmlns:p14="http://schemas.microsoft.com/office/powerpoint/2010/main" val="56151519"/>
-      </p:ext>
-    </p:extLst>
-  </p:cSld>
-  <p:clrMapOvr>
-    <a:masterClrMapping/>
-  </p:clrMapOvr>
-</p:notes>
-</file>
-
-<file path=ppt/notesSlides/notesSlide9.xml><?xml version="1.0" encoding="utf-8"?>
-<p:notes xmlns:a="http://schemas.openxmlformats.org/drawingml/2006/main" xmlns:r="http://schemas.openxmlformats.org/officeDocument/2006/relationships" xmlns:p="http://schemas.openxmlformats.org/presentationml/2006/main">
-  <p:cSld>
-    <p:spTree>
-      <p:nvGrpSpPr>
-        <p:cNvPr id="1" name=""/>
-        <p:cNvGrpSpPr/>
-        <p:nvPr/>
-      </p:nvGrpSpPr>
-      <p:grpSpPr>
-        <a:xfrm>
-          <a:off x="0" y="0"/>
-          <a:ext cx="0" cy="0"/>
-          <a:chOff x="0" y="0"/>
-          <a:chExt cx="0" cy="0"/>
-        </a:xfrm>
-      </p:grpSpPr>
-      <p:sp>
-        <p:nvSpPr>
-          <p:cNvPr id="2" name="Slide Image Placeholder 1"/>
-          <p:cNvSpPr>
-            <a:spLocks noGrp="1" noRot="1" noChangeAspect="1"/>
-          </p:cNvSpPr>
-          <p:nvPr>
-            <p:ph type="sldImg"/>
-          </p:nvPr>
-        </p:nvSpPr>
-        <p:spPr/>
-      </p:sp>
-      <p:sp>
-        <p:nvSpPr>
-          <p:cNvPr id="3" name="Notes Placeholder 2"/>
-          <p:cNvSpPr>
-            <a:spLocks noGrp="1"/>
-          </p:cNvSpPr>
-          <p:nvPr>
-            <p:ph type="body" idx="1"/>
-          </p:nvPr>
-        </p:nvSpPr>
-        <p:spPr/>
-        <p:txBody>
           <a:bodyPr/>
           <a:lstStyle/>
           <a:p>
@@ -6153,7 +3903,7 @@
               <a:pPr>
                 <a:defRPr/>
               </a:pPr>
-              <a:t>13</a:t>
+              <a:t>12</a:t>
             </a:fld>
             <a:endParaRPr lang="en-US"/>
           </a:p>
@@ -6353,7 +4103,7 @@
           <a:p>
             <a:fld id="{9FE18F2B-46EB-42F1-ADBB-7DC15FF809A9}" type="datetime1">
               <a:rPr lang="en-CA" smtClean="0"/>
-              <a:t>2019-04-30</a:t>
+              <a:t>2019-05-01</a:t>
             </a:fld>
             <a:endParaRPr lang="en-CA" dirty="0"/>
           </a:p>
@@ -6651,7 +4401,7 @@
           <a:p>
             <a:fld id="{89909B16-C605-46D9-9901-5F215FFB9844}" type="datetime1">
               <a:rPr lang="en-CA" smtClean="0"/>
-              <a:t>2019-04-30</a:t>
+              <a:t>2019-05-01</a:t>
             </a:fld>
             <a:endParaRPr lang="en-CA"/>
           </a:p>
@@ -6855,7 +4605,7 @@
           <a:p>
             <a:fld id="{9FB522E9-13A7-4907-A4DF-6AD586BEFFFD}" type="datetime1">
               <a:rPr lang="en-CA" smtClean="0"/>
-              <a:t>2019-04-30</a:t>
+              <a:t>2019-05-01</a:t>
             </a:fld>
             <a:endParaRPr lang="en-CA"/>
           </a:p>
@@ -7137,7 +4887,7 @@
           <a:p>
             <a:fld id="{B70F6ABA-023A-4E7E-9A89-58D5A720A925}" type="datetime1">
               <a:rPr lang="en-CA" smtClean="0"/>
-              <a:t>2019-04-30</a:t>
+              <a:t>2019-05-01</a:t>
             </a:fld>
             <a:endParaRPr lang="en-CA"/>
           </a:p>
@@ -7753,795 +5503,6 @@
       </p:grpSpPr>
       <p:sp>
         <p:nvSpPr>
-          <p:cNvPr id="5" name="Title 1"/>
-          <p:cNvSpPr txBox="1">
-            <a:spLocks/>
-          </p:cNvSpPr>
-          <p:nvPr/>
-        </p:nvSpPr>
-        <p:spPr bwMode="auto">
-          <a:xfrm>
-            <a:off x="457200" y="0"/>
-            <a:ext cx="3962400" cy="910617"/>
-          </a:xfrm>
-          <a:prstGeom prst="rect">
-            <a:avLst/>
-          </a:prstGeom>
-          <a:noFill/>
-          <a:ln w="9525">
-            <a:noFill/>
-            <a:miter lim="800000"/>
-            <a:headEnd/>
-            <a:tailEnd/>
-          </a:ln>
-        </p:spPr>
-        <p:txBody>
-          <a:bodyPr anchor="ctr"/>
-          <a:lstStyle/>
-          <a:p>
-            <a:pPr algn="ctr" eaLnBrk="0" hangingPunct="0">
-              <a:defRPr/>
-            </a:pPr>
-            <a:r>
-              <a:rPr lang="en-CA" sz="2800" b="1" dirty="0">
-                <a:solidFill>
-                  <a:schemeClr val="tx2"/>
-                </a:solidFill>
-                <a:latin typeface="+mj-lt"/>
-                <a:ea typeface="+mj-ea"/>
-                <a:cs typeface="+mj-cs"/>
-              </a:rPr>
-              <a:t>Without an application platform</a:t>
-            </a:r>
-          </a:p>
-        </p:txBody>
-      </p:sp>
-      <p:sp>
-        <p:nvSpPr>
-          <p:cNvPr id="6" name="Content Placeholder 2"/>
-          <p:cNvSpPr txBox="1">
-            <a:spLocks/>
-          </p:cNvSpPr>
-          <p:nvPr/>
-        </p:nvSpPr>
-        <p:spPr>
-          <a:xfrm>
-            <a:off x="457200" y="1268761"/>
-            <a:ext cx="4191000" cy="3168352"/>
-          </a:xfrm>
-          <a:prstGeom prst="rect">
-            <a:avLst/>
-          </a:prstGeom>
-        </p:spPr>
-        <p:txBody>
-          <a:bodyPr/>
-          <a:lstStyle/>
-          <a:p>
-            <a:pPr marL="342900" indent="-342900" eaLnBrk="0" hangingPunct="0">
-              <a:spcBef>
-                <a:spcPct val="20000"/>
-              </a:spcBef>
-              <a:buFont typeface="Arial" charset="0"/>
-              <a:buChar char="•"/>
-              <a:defRPr/>
-            </a:pPr>
-            <a:r>
-              <a:rPr lang="en-CA" sz="2400" dirty="0">
-                <a:latin typeface="+mn-lt"/>
-              </a:rPr>
-              <a:t>Each application is developed from ground up</a:t>
-            </a:r>
-          </a:p>
-          <a:p>
-            <a:pPr marL="342900" indent="-342900" eaLnBrk="0" hangingPunct="0">
-              <a:spcBef>
-                <a:spcPct val="20000"/>
-              </a:spcBef>
-              <a:buFont typeface="Arial" charset="0"/>
-              <a:buChar char="•"/>
-              <a:defRPr/>
-            </a:pPr>
-            <a:r>
-              <a:rPr lang="en-CA" sz="2400" dirty="0">
-                <a:latin typeface="+mn-lt"/>
-              </a:rPr>
-              <a:t>Completely new software is developed for each problem/procedure/device</a:t>
-            </a:r>
-          </a:p>
-          <a:p>
-            <a:pPr marL="342900" indent="-342900" eaLnBrk="0" hangingPunct="0">
-              <a:spcBef>
-                <a:spcPct val="20000"/>
-              </a:spcBef>
-              <a:buFont typeface="Arial" charset="0"/>
-              <a:buChar char="•"/>
-              <a:defRPr/>
-            </a:pPr>
-            <a:r>
-              <a:rPr lang="en-CA" sz="2400" dirty="0">
-                <a:latin typeface="+mn-lt"/>
-              </a:rPr>
-              <a:t>Significant work is needed to integrate new, advanced algorithms</a:t>
-            </a:r>
-          </a:p>
-          <a:p>
-            <a:pPr eaLnBrk="0" hangingPunct="0">
-              <a:spcBef>
-                <a:spcPct val="20000"/>
-              </a:spcBef>
-              <a:defRPr/>
-            </a:pPr>
-            <a:endParaRPr lang="en-CA" sz="2400" dirty="0">
-              <a:latin typeface="+mn-lt"/>
-            </a:endParaRPr>
-          </a:p>
-        </p:txBody>
-      </p:sp>
-      <p:sp>
-        <p:nvSpPr>
-          <p:cNvPr id="7" name="Content Placeholder 2"/>
-          <p:cNvSpPr txBox="1">
-            <a:spLocks/>
-          </p:cNvSpPr>
-          <p:nvPr/>
-        </p:nvSpPr>
-        <p:spPr bwMode="auto">
-          <a:xfrm>
-            <a:off x="4648200" y="1268759"/>
-            <a:ext cx="4419600" cy="3312369"/>
-          </a:xfrm>
-          <a:prstGeom prst="rect">
-            <a:avLst/>
-          </a:prstGeom>
-          <a:noFill/>
-          <a:ln w="9525">
-            <a:noFill/>
-            <a:miter lim="800000"/>
-            <a:headEnd/>
-            <a:tailEnd/>
-          </a:ln>
-        </p:spPr>
-        <p:txBody>
-          <a:bodyPr/>
-          <a:lstStyle/>
-          <a:p>
-            <a:pPr marL="342900" indent="-342900" eaLnBrk="0" hangingPunct="0">
-              <a:spcBef>
-                <a:spcPct val="20000"/>
-              </a:spcBef>
-              <a:buFont typeface="Arial" charset="0"/>
-              <a:buChar char="•"/>
-              <a:defRPr/>
-            </a:pPr>
-            <a:r>
-              <a:rPr lang="en-CA" sz="2400" dirty="0">
-                <a:latin typeface="+mn-lt"/>
-              </a:rPr>
-              <a:t>Core functionalities are already implemented</a:t>
-            </a:r>
-          </a:p>
-          <a:p>
-            <a:pPr marL="342900" indent="-342900" eaLnBrk="0" hangingPunct="0">
-              <a:spcBef>
-                <a:spcPct val="20000"/>
-              </a:spcBef>
-              <a:buFont typeface="Arial" charset="0"/>
-              <a:buChar char="•"/>
-              <a:defRPr/>
-            </a:pPr>
-            <a:r>
-              <a:rPr lang="en-US" sz="2400" dirty="0">
-                <a:latin typeface="+mn-lt"/>
-              </a:rPr>
-              <a:t>New software modules can be developed for specific needs</a:t>
-            </a:r>
-            <a:endParaRPr lang="en-CA" sz="2400" dirty="0">
-              <a:latin typeface="+mn-lt"/>
-            </a:endParaRPr>
-          </a:p>
-          <a:p>
-            <a:pPr marL="342900" indent="-342900" eaLnBrk="0" hangingPunct="0">
-              <a:spcBef>
-                <a:spcPct val="20000"/>
-              </a:spcBef>
-              <a:buFont typeface="Arial" charset="0"/>
-              <a:buChar char="•"/>
-              <a:defRPr/>
-            </a:pPr>
-            <a:r>
-              <a:rPr lang="en-CA" sz="2400" dirty="0">
-                <a:latin typeface="+mn-lt"/>
-              </a:rPr>
-              <a:t>Many new, advanced algorithms are available</a:t>
-            </a:r>
-          </a:p>
-          <a:p>
-            <a:pPr marL="342900" indent="-342900" eaLnBrk="0" hangingPunct="0">
-              <a:spcBef>
-                <a:spcPct val="20000"/>
-              </a:spcBef>
-              <a:buFont typeface="Arial" charset="0"/>
-              <a:buChar char="•"/>
-              <a:defRPr/>
-            </a:pPr>
-            <a:r>
-              <a:rPr lang="en-CA" sz="2400" dirty="0">
-                <a:latin typeface="+mn-lt"/>
-              </a:rPr>
-              <a:t>Well-supported with a large user and developer community</a:t>
-            </a:r>
-          </a:p>
-          <a:p>
-            <a:pPr algn="ctr" eaLnBrk="0" hangingPunct="0">
-              <a:spcBef>
-                <a:spcPct val="20000"/>
-              </a:spcBef>
-              <a:buFont typeface="Arial" charset="0"/>
-              <a:buNone/>
-              <a:defRPr/>
-            </a:pPr>
-            <a:endParaRPr lang="en-CA" sz="2400" dirty="0">
-              <a:latin typeface="+mn-lt"/>
-            </a:endParaRPr>
-          </a:p>
-        </p:txBody>
-      </p:sp>
-      <p:sp>
-        <p:nvSpPr>
-          <p:cNvPr id="8" name="Title 1"/>
-          <p:cNvSpPr txBox="1">
-            <a:spLocks/>
-          </p:cNvSpPr>
-          <p:nvPr/>
-        </p:nvSpPr>
-        <p:spPr bwMode="auto">
-          <a:xfrm>
-            <a:off x="4800600" y="0"/>
-            <a:ext cx="3962400" cy="910617"/>
-          </a:xfrm>
-          <a:prstGeom prst="rect">
-            <a:avLst/>
-          </a:prstGeom>
-          <a:noFill/>
-          <a:ln w="9525">
-            <a:noFill/>
-            <a:miter lim="800000"/>
-            <a:headEnd/>
-            <a:tailEnd/>
-          </a:ln>
-        </p:spPr>
-        <p:txBody>
-          <a:bodyPr anchor="ctr"/>
-          <a:lstStyle/>
-          <a:p>
-            <a:pPr algn="ctr" eaLnBrk="0" hangingPunct="0">
-              <a:defRPr/>
-            </a:pPr>
-            <a:r>
-              <a:rPr lang="en-CA" sz="2800" b="1" dirty="0">
-                <a:solidFill>
-                  <a:schemeClr val="tx2"/>
-                </a:solidFill>
-                <a:latin typeface="+mj-lt"/>
-                <a:ea typeface="+mj-ea"/>
-                <a:cs typeface="+mj-cs"/>
-              </a:rPr>
-              <a:t>Building on an application platform</a:t>
-            </a:r>
-          </a:p>
-        </p:txBody>
-      </p:sp>
-      <p:grpSp>
-        <p:nvGrpSpPr>
-          <p:cNvPr id="16" name="Group 15"/>
-          <p:cNvGrpSpPr/>
-          <p:nvPr/>
-        </p:nvGrpSpPr>
-        <p:grpSpPr>
-          <a:xfrm>
-            <a:off x="381000" y="4772000"/>
-            <a:ext cx="8393138" cy="1226208"/>
-            <a:chOff x="381000" y="4772000"/>
-            <a:chExt cx="8393138" cy="1226208"/>
-          </a:xfrm>
-        </p:grpSpPr>
-        <p:grpSp>
-          <p:nvGrpSpPr>
-            <p:cNvPr id="4" name="Group 3"/>
-            <p:cNvGrpSpPr/>
-            <p:nvPr/>
-          </p:nvGrpSpPr>
-          <p:grpSpPr>
-            <a:xfrm>
-              <a:off x="381000" y="4772000"/>
-              <a:ext cx="3902968" cy="1202928"/>
-              <a:chOff x="381000" y="4772000"/>
-              <a:chExt cx="3902968" cy="1202928"/>
-            </a:xfrm>
-          </p:grpSpPr>
-          <p:sp>
-            <p:nvSpPr>
-              <p:cNvPr id="3" name="Rectangle 2"/>
-              <p:cNvSpPr/>
-              <p:nvPr/>
-            </p:nvSpPr>
-            <p:spPr>
-              <a:xfrm>
-                <a:off x="907976" y="4822800"/>
-                <a:ext cx="3375992" cy="1152128"/>
-              </a:xfrm>
-              <a:prstGeom prst="rect">
-                <a:avLst/>
-              </a:prstGeom>
-              <a:noFill/>
-              <a:ln>
-                <a:noFill/>
-              </a:ln>
-            </p:spPr>
-            <p:style>
-              <a:lnRef idx="2">
-                <a:schemeClr val="accent1">
-                  <a:shade val="50000"/>
-                </a:schemeClr>
-              </a:lnRef>
-              <a:fillRef idx="1">
-                <a:schemeClr val="accent1"/>
-              </a:fillRef>
-              <a:effectRef idx="0">
-                <a:schemeClr val="accent1"/>
-              </a:effectRef>
-              <a:fontRef idx="minor">
-                <a:schemeClr val="lt1"/>
-              </a:fontRef>
-            </p:style>
-            <p:txBody>
-              <a:bodyPr rtlCol="0" anchor="ctr"/>
-              <a:lstStyle/>
-              <a:p>
-                <a:pPr eaLnBrk="0" hangingPunct="0">
-                  <a:spcBef>
-                    <a:spcPct val="20000"/>
-                  </a:spcBef>
-                  <a:buFont typeface="Arial" charset="0"/>
-                  <a:buNone/>
-                  <a:defRPr/>
-                </a:pPr>
-                <a:r>
-                  <a:rPr lang="en-CA" sz="2400" dirty="0">
-                    <a:solidFill>
-                      <a:srgbClr val="00B050"/>
-                    </a:solidFill>
-                  </a:rPr>
-                  <a:t>Quick start.</a:t>
-                </a:r>
-              </a:p>
-              <a:p>
-                <a:pPr eaLnBrk="0" hangingPunct="0">
-                  <a:spcBef>
-                    <a:spcPct val="20000"/>
-                  </a:spcBef>
-                  <a:buFont typeface="Arial" charset="0"/>
-                  <a:buNone/>
-                  <a:defRPr/>
-                </a:pPr>
-                <a:r>
-                  <a:rPr lang="en-CA" sz="2400" dirty="0">
-                    <a:solidFill>
-                      <a:srgbClr val="FF0000"/>
-                    </a:solidFill>
-                  </a:rPr>
-                  <a:t>Huge waste of time, money, and effort overall.</a:t>
-                </a:r>
-              </a:p>
-            </p:txBody>
-          </p:sp>
-          <p:pic>
-            <p:nvPicPr>
-              <p:cNvPr id="11" name="Picture 2" descr="C:\Documents and Settings\andras\Local Settings\Temporary Internet Files\Content.IE5\PGE4P71G\MC900441322[1].png"/>
-              <p:cNvPicPr>
-                <a:picLocks noChangeAspect="1" noChangeArrowheads="1"/>
-              </p:cNvPicPr>
-              <p:nvPr/>
-            </p:nvPicPr>
-            <p:blipFill>
-              <a:blip r:embed="rId4" cstate="print"/>
-              <a:srcRect/>
-              <a:stretch>
-                <a:fillRect/>
-              </a:stretch>
-            </p:blipFill>
-            <p:spPr bwMode="auto">
-              <a:xfrm>
-                <a:off x="403920" y="4772000"/>
-                <a:ext cx="457200" cy="457200"/>
-              </a:xfrm>
-              <a:prstGeom prst="rect">
-                <a:avLst/>
-              </a:prstGeom>
-              <a:noFill/>
-            </p:spPr>
-          </p:pic>
-          <p:pic>
-            <p:nvPicPr>
-              <p:cNvPr id="12" name="Picture 3" descr="C:\Documents and Settings\andras\Local Settings\Temporary Internet Files\Content.IE5\KAA245SN\MC900441321[1].png"/>
-              <p:cNvPicPr>
-                <a:picLocks noChangeAspect="1" noChangeArrowheads="1"/>
-              </p:cNvPicPr>
-              <p:nvPr/>
-            </p:nvPicPr>
-            <p:blipFill>
-              <a:blip r:embed="rId5" cstate="print"/>
-              <a:srcRect/>
-              <a:stretch>
-                <a:fillRect/>
-              </a:stretch>
-            </p:blipFill>
-            <p:spPr bwMode="auto">
-              <a:xfrm>
-                <a:off x="381000" y="5492080"/>
-                <a:ext cx="457200" cy="457200"/>
-              </a:xfrm>
-              <a:prstGeom prst="rect">
-                <a:avLst/>
-              </a:prstGeom>
-              <a:noFill/>
-            </p:spPr>
-          </p:pic>
-        </p:grpSp>
-        <p:grpSp>
-          <p:nvGrpSpPr>
-            <p:cNvPr id="15" name="Group 14"/>
-            <p:cNvGrpSpPr/>
-            <p:nvPr/>
-          </p:nvGrpSpPr>
-          <p:grpSpPr>
-            <a:xfrm>
-              <a:off x="4644008" y="4822374"/>
-              <a:ext cx="4130130" cy="1175834"/>
-              <a:chOff x="4644008" y="4822374"/>
-              <a:chExt cx="4130130" cy="1175834"/>
-            </a:xfrm>
-          </p:grpSpPr>
-          <p:sp>
-            <p:nvSpPr>
-              <p:cNvPr id="9" name="Rectangle 8"/>
-              <p:cNvSpPr/>
-              <p:nvPr/>
-            </p:nvSpPr>
-            <p:spPr>
-              <a:xfrm>
-                <a:off x="5110114" y="4822374"/>
-                <a:ext cx="3664024" cy="1175834"/>
-              </a:xfrm>
-              <a:prstGeom prst="rect">
-                <a:avLst/>
-              </a:prstGeom>
-              <a:noFill/>
-              <a:ln>
-                <a:noFill/>
-              </a:ln>
-            </p:spPr>
-            <p:style>
-              <a:lnRef idx="2">
-                <a:schemeClr val="accent1">
-                  <a:shade val="50000"/>
-                </a:schemeClr>
-              </a:lnRef>
-              <a:fillRef idx="1">
-                <a:schemeClr val="accent1"/>
-              </a:fillRef>
-              <a:effectRef idx="0">
-                <a:schemeClr val="accent1"/>
-              </a:effectRef>
-              <a:fontRef idx="minor">
-                <a:schemeClr val="lt1"/>
-              </a:fontRef>
-            </p:style>
-            <p:txBody>
-              <a:bodyPr rtlCol="0" anchor="ctr"/>
-              <a:lstStyle/>
-              <a:p>
-                <a:pPr eaLnBrk="0" hangingPunct="0">
-                  <a:spcBef>
-                    <a:spcPct val="20000"/>
-                  </a:spcBef>
-                  <a:buFont typeface="Arial" charset="0"/>
-                  <a:buNone/>
-                  <a:defRPr/>
-                </a:pPr>
-                <a:r>
-                  <a:rPr lang="en-CA" sz="2400" dirty="0">
-                    <a:solidFill>
-                      <a:srgbClr val="FF0000"/>
-                    </a:solidFill>
-                  </a:rPr>
-                  <a:t>Investment at the beginning: </a:t>
-                </a:r>
-                <a:r>
-                  <a:rPr lang="en-CA" sz="2400" dirty="0">
-                    <a:solidFill>
-                      <a:srgbClr val="00B050"/>
-                    </a:solidFill>
-                  </a:rPr>
-                  <a:t>learning</a:t>
-                </a:r>
-                <a:r>
-                  <a:rPr lang="en-CA" sz="2400" dirty="0">
-                    <a:solidFill>
-                      <a:srgbClr val="FF0000"/>
-                    </a:solidFill>
-                  </a:rPr>
-                  <a:t>.</a:t>
-                </a:r>
-              </a:p>
-              <a:p>
-                <a:pPr eaLnBrk="0" hangingPunct="0">
-                  <a:spcBef>
-                    <a:spcPct val="20000"/>
-                  </a:spcBef>
-                  <a:buFont typeface="Arial" charset="0"/>
-                  <a:buNone/>
-                  <a:defRPr/>
-                </a:pPr>
-                <a:r>
-                  <a:rPr lang="en-CA" sz="2400" dirty="0">
-                    <a:solidFill>
-                      <a:srgbClr val="00B050"/>
-                    </a:solidFill>
-                  </a:rPr>
-                  <a:t>Minimal wasted efforts. </a:t>
-                </a:r>
-              </a:p>
-            </p:txBody>
-          </p:sp>
-          <p:pic>
-            <p:nvPicPr>
-              <p:cNvPr id="13" name="Picture 2" descr="C:\Documents and Settings\andras\Local Settings\Temporary Internet Files\Content.IE5\PGE4P71G\MC900441322[1].png"/>
-              <p:cNvPicPr>
-                <a:picLocks noChangeAspect="1" noChangeArrowheads="1"/>
-              </p:cNvPicPr>
-              <p:nvPr/>
-            </p:nvPicPr>
-            <p:blipFill>
-              <a:blip r:embed="rId4" cstate="print"/>
-              <a:srcRect/>
-              <a:stretch>
-                <a:fillRect/>
-              </a:stretch>
-            </p:blipFill>
-            <p:spPr bwMode="auto">
-              <a:xfrm>
-                <a:off x="4644008" y="5541008"/>
-                <a:ext cx="457200" cy="457200"/>
-              </a:xfrm>
-              <a:prstGeom prst="rect">
-                <a:avLst/>
-              </a:prstGeom>
-              <a:noFill/>
-            </p:spPr>
-          </p:pic>
-          <p:pic>
-            <p:nvPicPr>
-              <p:cNvPr id="14" name="Picture 3" descr="C:\Documents and Settings\andras\Local Settings\Temporary Internet Files\Content.IE5\KAA245SN\MC900441321[1].png"/>
-              <p:cNvPicPr>
-                <a:picLocks noChangeAspect="1" noChangeArrowheads="1"/>
-              </p:cNvPicPr>
-              <p:nvPr/>
-            </p:nvPicPr>
-            <p:blipFill>
-              <a:blip r:embed="rId5" cstate="print"/>
-              <a:srcRect/>
-              <a:stretch>
-                <a:fillRect/>
-              </a:stretch>
-            </p:blipFill>
-            <p:spPr bwMode="auto">
-              <a:xfrm>
-                <a:off x="4644008" y="4916016"/>
-                <a:ext cx="457200" cy="457200"/>
-              </a:xfrm>
-              <a:prstGeom prst="rect">
-                <a:avLst/>
-              </a:prstGeom>
-              <a:noFill/>
-            </p:spPr>
-          </p:pic>
-        </p:grpSp>
-      </p:grpSp>
-      <p:sp>
-        <p:nvSpPr>
-          <p:cNvPr id="20" name="Slide Number Placeholder 1"/>
-          <p:cNvSpPr>
-            <a:spLocks noGrp="1"/>
-          </p:cNvSpPr>
-          <p:nvPr>
-            <p:ph type="sldNum" sz="quarter" idx="10"/>
-          </p:nvPr>
-        </p:nvSpPr>
-        <p:spPr>
-          <a:xfrm>
-            <a:off x="7162800" y="6356350"/>
-            <a:ext cx="533400" cy="365125"/>
-          </a:xfrm>
-        </p:spPr>
-        <p:txBody>
-          <a:bodyPr/>
-          <a:lstStyle/>
-          <a:p>
-            <a:pPr algn="ctr">
-              <a:defRPr/>
-            </a:pPr>
-            <a:r>
-              <a:rPr lang="en-US" dirty="0"/>
-              <a:t>- </a:t>
-            </a:r>
-            <a:fld id="{56889711-7CC8-4EBF-93B1-BBA7911D692F}" type="slidenum">
-              <a:rPr lang="en-US" smtClean="0"/>
-              <a:t>11</a:t>
-            </a:fld>
-            <a:r>
-              <a:rPr lang="en-US" dirty="0"/>
-              <a:t> -</a:t>
-            </a:r>
-          </a:p>
-        </p:txBody>
-      </p:sp>
-      <p:sp>
-        <p:nvSpPr>
-          <p:cNvPr id="21" name="Footer Placeholder 2"/>
-          <p:cNvSpPr>
-            <a:spLocks noGrp="1"/>
-          </p:cNvSpPr>
-          <p:nvPr>
-            <p:ph type="ftr" sz="quarter" idx="11"/>
-          </p:nvPr>
-        </p:nvSpPr>
-        <p:spPr>
-          <a:xfrm>
-            <a:off x="1905000" y="6356350"/>
-            <a:ext cx="5257800" cy="365125"/>
-          </a:xfrm>
-        </p:spPr>
-        <p:txBody>
-          <a:bodyPr/>
-          <a:lstStyle/>
-          <a:p>
-            <a:pPr>
-              <a:defRPr/>
-            </a:pPr>
-            <a:r>
-              <a:rPr lang="en-US" dirty="0"/>
-              <a:t>Laboratory for Percutaneous Surgery – Copyright © Queen’s University, 2019</a:t>
-            </a:r>
-          </a:p>
-        </p:txBody>
-      </p:sp>
-    </p:spTree>
-    <p:custDataLst>
-      <p:tags r:id="rId1"/>
-    </p:custDataLst>
-    <p:extLst>
-      <p:ext uri="{BB962C8B-B14F-4D97-AF65-F5344CB8AC3E}">
-        <p14:creationId xmlns:p14="http://schemas.microsoft.com/office/powerpoint/2010/main" val="76428727"/>
-      </p:ext>
-    </p:extLst>
-  </p:cSld>
-  <p:clrMapOvr>
-    <a:masterClrMapping/>
-  </p:clrMapOvr>
-  <mc:AlternateContent xmlns:mc="http://schemas.openxmlformats.org/markup-compatibility/2006" xmlns:p14="http://schemas.microsoft.com/office/powerpoint/2010/main">
-    <mc:Choice Requires="p14">
-      <p:transition spd="slow" p14:dur="2000" advTm="1579"/>
-    </mc:Choice>
-    <mc:Fallback xmlns="">
-      <p:transition spd="slow" advTm="1579"/>
-    </mc:Fallback>
-  </mc:AlternateContent>
-  <p:timing>
-    <p:tnLst>
-      <p:par>
-        <p:cTn id="1" dur="indefinite" restart="never" nodeType="tmRoot">
-          <p:childTnLst>
-            <p:seq concurrent="1" nextAc="seek">
-              <p:cTn id="2" dur="indefinite" nodeType="mainSeq">
-                <p:childTnLst>
-                  <p:par>
-                    <p:cTn id="3" fill="hold">
-                      <p:stCondLst>
-                        <p:cond delay="indefinite"/>
-                      </p:stCondLst>
-                      <p:childTnLst>
-                        <p:par>
-                          <p:cTn id="4" fill="hold">
-                            <p:stCondLst>
-                              <p:cond delay="0"/>
-                            </p:stCondLst>
-                            <p:childTnLst>
-                              <p:par>
-                                <p:cTn id="5" presetID="10" presetClass="entr" presetSubtype="0" fill="hold" nodeType="clickEffect">
-                                  <p:stCondLst>
-                                    <p:cond delay="0"/>
-                                  </p:stCondLst>
-                                  <p:childTnLst>
-                                    <p:set>
-                                      <p:cBhvr>
-                                        <p:cTn id="6" dur="1" fill="hold">
-                                          <p:stCondLst>
-                                            <p:cond delay="0"/>
-                                          </p:stCondLst>
-                                        </p:cTn>
-                                        <p:tgtEl>
-                                          <p:spTgt spid="16"/>
-                                        </p:tgtEl>
-                                        <p:attrNameLst>
-                                          <p:attrName>style.visibility</p:attrName>
-                                        </p:attrNameLst>
-                                      </p:cBhvr>
-                                      <p:to>
-                                        <p:strVal val="visible"/>
-                                      </p:to>
-                                    </p:set>
-                                    <p:animEffect transition="in" filter="fade">
-                                      <p:cBhvr>
-                                        <p:cTn id="7" dur="500"/>
-                                        <p:tgtEl>
-                                          <p:spTgt spid="16"/>
-                                        </p:tgtEl>
-                                      </p:cBhvr>
-                                    </p:animEffect>
-                                  </p:childTnLst>
-                                </p:cTn>
-                              </p:par>
-                            </p:childTnLst>
-                          </p:cTn>
-                        </p:par>
-                      </p:childTnLst>
-                    </p:cTn>
-                  </p:par>
-                </p:childTnLst>
-              </p:cTn>
-              <p:prevCondLst>
-                <p:cond evt="onPrev" delay="0">
-                  <p:tgtEl>
-                    <p:sldTgt/>
-                  </p:tgtEl>
-                </p:cond>
-              </p:prevCondLst>
-              <p:nextCondLst>
-                <p:cond evt="onNext" delay="0">
-                  <p:tgtEl>
-                    <p:sldTgt/>
-                  </p:tgtEl>
-                </p:cond>
-              </p:nextCondLst>
-            </p:seq>
-          </p:childTnLst>
-        </p:cTn>
-      </p:par>
-    </p:tnLst>
-  </p:timing>
-</p:sld>
-</file>
-
-<file path=ppt/slides/slide12.xml><?xml version="1.0" encoding="utf-8"?>
-<p:sld xmlns:a="http://schemas.openxmlformats.org/drawingml/2006/main" xmlns:r="http://schemas.openxmlformats.org/officeDocument/2006/relationships" xmlns:p="http://schemas.openxmlformats.org/presentationml/2006/main">
-  <p:cSld>
-    <p:spTree>
-      <p:nvGrpSpPr>
-        <p:cNvPr id="1" name=""/>
-        <p:cNvGrpSpPr/>
-        <p:nvPr/>
-      </p:nvGrpSpPr>
-      <p:grpSpPr>
-        <a:xfrm>
-          <a:off x="0" y="0"/>
-          <a:ext cx="0" cy="0"/>
-          <a:chOff x="0" y="0"/>
-          <a:chExt cx="0" cy="0"/>
-        </a:xfrm>
-      </p:grpSpPr>
-      <p:sp>
-        <p:nvSpPr>
           <p:cNvPr id="2" name="Title 1"/>
           <p:cNvSpPr>
             <a:spLocks noGrp="1"/>
@@ -8749,7 +5710,7 @@
 </p:sld>
 </file>
 
-<file path=ppt/slides/slide13.xml><?xml version="1.0" encoding="utf-8"?>
+<file path=ppt/slides/slide12.xml><?xml version="1.0" encoding="utf-8"?>
 <p:sld xmlns:a="http://schemas.openxmlformats.org/drawingml/2006/main" xmlns:r="http://schemas.openxmlformats.org/officeDocument/2006/relationships" xmlns:p="http://schemas.openxmlformats.org/presentationml/2006/main">
   <p:cSld>
     <p:spTree>
@@ -11442,7 +8403,7 @@
             </a:r>
             <a:fld id="{5956B730-B1F8-44BC-BA64-192B445FEF2C}" type="slidenum">
               <a:rPr lang="en-US" smtClean="0"/>
-              <a:t>13</a:t>
+              <a:t>12</a:t>
             </a:fld>
             <a:r>
               <a:rPr lang="en-US" dirty="0"/>
@@ -11477,6 +8438,45 @@
             <a:r>
               <a:rPr lang="en-US" dirty="0"/>
               <a:t>Laboratory for Percutaneous Surgery – Copyright © Queen’s University, 2019</a:t>
+            </a:r>
+          </a:p>
+        </p:txBody>
+      </p:sp>
+      <p:sp>
+        <p:nvSpPr>
+          <p:cNvPr id="91" name="TextBox 90">
+            <a:extLst>
+              <a:ext uri="{FF2B5EF4-FFF2-40B4-BE49-F238E27FC236}">
+                <a16:creationId xmlns:a16="http://schemas.microsoft.com/office/drawing/2014/main" id="{36E1B244-8CEA-4ADE-B4BA-F474731B0BC7}"/>
+              </a:ext>
+            </a:extLst>
+          </p:cNvPr>
+          <p:cNvSpPr txBox="1"/>
+          <p:nvPr/>
+        </p:nvSpPr>
+        <p:spPr>
+          <a:xfrm>
+            <a:off x="1803878" y="958958"/>
+            <a:ext cx="795803" cy="338554"/>
+          </a:xfrm>
+          <a:prstGeom prst="rect">
+            <a:avLst/>
+          </a:prstGeom>
+          <a:noFill/>
+        </p:spPr>
+        <p:txBody>
+          <a:bodyPr wrap="square" rtlCol="0">
+            <a:spAutoFit/>
+          </a:bodyPr>
+          <a:lstStyle/>
+          <a:p>
+            <a:r>
+              <a:rPr lang="en-CA" sz="1600" b="1" dirty="0">
+                <a:highlight>
+                  <a:srgbClr val="FFFF00"/>
+                </a:highlight>
+              </a:rPr>
+              <a:t>0.01%</a:t>
             </a:r>
           </a:p>
         </p:txBody>
@@ -11502,196 +8502,7 @@
 </p:sld>
 </file>
 
-<file path=ppt/slides/slide14.xml><?xml version="1.0" encoding="utf-8"?>
-<p:sld xmlns:a="http://schemas.openxmlformats.org/drawingml/2006/main" xmlns:r="http://schemas.openxmlformats.org/officeDocument/2006/relationships" xmlns:p="http://schemas.openxmlformats.org/presentationml/2006/main">
-  <p:cSld>
-    <p:spTree>
-      <p:nvGrpSpPr>
-        <p:cNvPr id="1" name=""/>
-        <p:cNvGrpSpPr/>
-        <p:nvPr/>
-      </p:nvGrpSpPr>
-      <p:grpSpPr>
-        <a:xfrm>
-          <a:off x="0" y="0"/>
-          <a:ext cx="0" cy="0"/>
-          <a:chOff x="0" y="0"/>
-          <a:chExt cx="0" cy="0"/>
-        </a:xfrm>
-      </p:grpSpPr>
-      <p:sp>
-        <p:nvSpPr>
-          <p:cNvPr id="78" name="Title 1"/>
-          <p:cNvSpPr>
-            <a:spLocks noGrp="1"/>
-          </p:cNvSpPr>
-          <p:nvPr>
-            <p:ph type="title"/>
-          </p:nvPr>
-        </p:nvSpPr>
-        <p:spPr>
-          <a:xfrm>
-            <a:off x="457200" y="122238"/>
-            <a:ext cx="8229600" cy="868362"/>
-          </a:xfrm>
-        </p:spPr>
-        <p:txBody>
-          <a:bodyPr/>
-          <a:lstStyle/>
-          <a:p>
-            <a:r>
-              <a:rPr lang="en-US" dirty="0"/>
-              <a:t>Building on a platform</a:t>
-            </a:r>
-          </a:p>
-        </p:txBody>
-      </p:sp>
-      <p:graphicFrame>
-        <p:nvGraphicFramePr>
-          <p:cNvPr id="91" name="Chart 90"/>
-          <p:cNvGraphicFramePr>
-            <a:graphicFrameLocks/>
-          </p:cNvGraphicFramePr>
-          <p:nvPr>
-            <p:extLst/>
-          </p:nvPr>
-        </p:nvGraphicFramePr>
-        <p:xfrm>
-          <a:off x="304800" y="1189546"/>
-          <a:ext cx="8502253" cy="4802587"/>
-        </p:xfrm>
-        <a:graphic>
-          <a:graphicData uri="http://schemas.openxmlformats.org/drawingml/2006/chart">
-            <c:chart xmlns:c="http://schemas.openxmlformats.org/drawingml/2006/chart" xmlns:r="http://schemas.openxmlformats.org/officeDocument/2006/relationships" r:id="rId3"/>
-          </a:graphicData>
-        </a:graphic>
-      </p:graphicFrame>
-      <p:sp>
-        <p:nvSpPr>
-          <p:cNvPr id="6" name="Slide Number Placeholder 1"/>
-          <p:cNvSpPr>
-            <a:spLocks noGrp="1"/>
-          </p:cNvSpPr>
-          <p:nvPr>
-            <p:ph type="sldNum" sz="quarter" idx="10"/>
-          </p:nvPr>
-        </p:nvSpPr>
-        <p:spPr>
-          <a:xfrm>
-            <a:off x="7162800" y="6356350"/>
-            <a:ext cx="533400" cy="365125"/>
-          </a:xfrm>
-        </p:spPr>
-        <p:txBody>
-          <a:bodyPr/>
-          <a:lstStyle/>
-          <a:p>
-            <a:pPr algn="ctr">
-              <a:defRPr/>
-            </a:pPr>
-            <a:r>
-              <a:rPr lang="en-US" dirty="0"/>
-              <a:t>- </a:t>
-            </a:r>
-            <a:fld id="{0FBE626C-499D-4BDB-89F5-AB508D400932}" type="slidenum">
-              <a:rPr lang="en-US" smtClean="0"/>
-              <a:t>14</a:t>
-            </a:fld>
-            <a:r>
-              <a:rPr lang="en-US" dirty="0"/>
-              <a:t> -</a:t>
-            </a:r>
-          </a:p>
-        </p:txBody>
-      </p:sp>
-      <p:sp>
-        <p:nvSpPr>
-          <p:cNvPr id="7" name="Footer Placeholder 2"/>
-          <p:cNvSpPr>
-            <a:spLocks noGrp="1"/>
-          </p:cNvSpPr>
-          <p:nvPr>
-            <p:ph type="ftr" sz="quarter" idx="11"/>
-          </p:nvPr>
-        </p:nvSpPr>
-        <p:spPr>
-          <a:xfrm>
-            <a:off x="1905000" y="6356350"/>
-            <a:ext cx="5257800" cy="365125"/>
-          </a:xfrm>
-        </p:spPr>
-        <p:txBody>
-          <a:bodyPr/>
-          <a:lstStyle/>
-          <a:p>
-            <a:pPr>
-              <a:defRPr/>
-            </a:pPr>
-            <a:r>
-              <a:rPr lang="en-US" dirty="0"/>
-              <a:t>Laboratory for Percutaneous Surgery – Copyright © Queen’s University, 2019</a:t>
-            </a:r>
-          </a:p>
-        </p:txBody>
-      </p:sp>
-      <p:pic>
-        <p:nvPicPr>
-          <p:cNvPr id="3" name="Picture 2">
-            <a:extLst>
-              <a:ext uri="{FF2B5EF4-FFF2-40B4-BE49-F238E27FC236}">
-                <a16:creationId xmlns:a16="http://schemas.microsoft.com/office/drawing/2014/main" id="{D05B0EBD-9563-4DEE-9470-26325A284609}"/>
-              </a:ext>
-            </a:extLst>
-          </p:cNvPr>
-          <p:cNvPicPr>
-            <a:picLocks noChangeAspect="1"/>
-          </p:cNvPicPr>
-          <p:nvPr/>
-        </p:nvPicPr>
-        <p:blipFill>
-          <a:blip r:embed="rId4" cstate="print">
-            <a:extLst>
-              <a:ext uri="{28A0092B-C50C-407E-A947-70E740481C1C}">
-                <a14:useLocalDpi xmlns:a14="http://schemas.microsoft.com/office/drawing/2010/main" val="0"/>
-              </a:ext>
-            </a:extLst>
-          </a:blip>
-          <a:stretch>
-            <a:fillRect/>
-          </a:stretch>
-        </p:blipFill>
-        <p:spPr>
-          <a:xfrm>
-            <a:off x="5724128" y="5381001"/>
-            <a:ext cx="2195736" cy="1006379"/>
-          </a:xfrm>
-          <a:prstGeom prst="rect">
-            <a:avLst/>
-          </a:prstGeom>
-        </p:spPr>
-      </p:pic>
-    </p:spTree>
-    <p:extLst>
-      <p:ext uri="{BB962C8B-B14F-4D97-AF65-F5344CB8AC3E}">
-        <p14:creationId xmlns:p14="http://schemas.microsoft.com/office/powerpoint/2010/main" val="1711046565"/>
-      </p:ext>
-    </p:extLst>
-  </p:cSld>
-  <p:clrMapOvr>
-    <a:masterClrMapping/>
-  </p:clrMapOvr>
-  <mc:AlternateContent xmlns:mc="http://schemas.openxmlformats.org/markup-compatibility/2006" xmlns:p14="http://schemas.microsoft.com/office/powerpoint/2010/main">
-    <mc:Choice Requires="p14">
-      <p:transition spd="slow" p14:dur="2000" advTm="163"/>
-    </mc:Choice>
-    <mc:Fallback xmlns="">
-      <p:transition spd="slow" advTm="163"/>
-    </mc:Fallback>
-  </mc:AlternateContent>
-</p:sld>
-</file>
-
-<file path=ppt/slides/slide15.xml><?xml version="1.0" encoding="utf-8"?>
+<file path=ppt/slides/slide13.xml><?xml version="1.0" encoding="utf-8"?>
 <p:sld xmlns:a="http://schemas.openxmlformats.org/drawingml/2006/main" xmlns:r="http://schemas.openxmlformats.org/officeDocument/2006/relationships" xmlns:p="http://schemas.openxmlformats.org/presentationml/2006/main">
   <p:cSld>
     <p:spTree>
@@ -15151,12 +11962,6 @@
     <a:masterClrMapping/>
   </p:clrMapOvr>
 </p:sld>
-</file>
-
-<file path=ppt/tags/tag1.xml><?xml version="1.0" encoding="utf-8"?>
-<p:tagLst xmlns:a="http://schemas.openxmlformats.org/drawingml/2006/main" xmlns:r="http://schemas.openxmlformats.org/officeDocument/2006/relationships" xmlns:p="http://schemas.openxmlformats.org/presentationml/2006/main">
-  <p:tag name="TIMING" val="|0.2|0.1|0.1|0.1|0.1|0.1|0.1|0.2"/>
-</p:tagLst>
 </file>
 
 <file path=ppt/theme/theme1.xml><?xml version="1.0" encoding="utf-8"?>

</xml_diff>

<commit_message>
Slide updates for 2021
</commit_message>
<xml_diff>
--- a/Doc/day1_1_PerkLabResearchMethodology.pptx
+++ b/Doc/day1_1_PerkLabResearchMethodology.pptx
@@ -2898,7 +2898,7 @@
             <a:fld id="{A6E16264-6225-448A-8F6B-37C607BF693C}" type="datetimeFigureOut">
               <a:rPr lang="en-CA" smtClean="0"/>
               <a:pPr/>
-              <a:t>2021-05-02</a:t>
+              <a:t>2021-05-03</a:t>
             </a:fld>
             <a:endParaRPr lang="en-CA"/>
           </a:p>
@@ -4104,7 +4104,7 @@
           <a:p>
             <a:fld id="{9FE18F2B-46EB-42F1-ADBB-7DC15FF809A9}" type="datetime1">
               <a:rPr lang="en-CA" smtClean="0"/>
-              <a:t>2021-05-02</a:t>
+              <a:t>2021-05-03</a:t>
             </a:fld>
             <a:endParaRPr lang="en-CA" dirty="0"/>
           </a:p>
@@ -4402,7 +4402,7 @@
           <a:p>
             <a:fld id="{89909B16-C605-46D9-9901-5F215FFB9844}" type="datetime1">
               <a:rPr lang="en-CA" smtClean="0"/>
-              <a:t>2021-05-02</a:t>
+              <a:t>2021-05-03</a:t>
             </a:fld>
             <a:endParaRPr lang="en-CA"/>
           </a:p>
@@ -4606,7 +4606,7 @@
           <a:p>
             <a:fld id="{9FB522E9-13A7-4907-A4DF-6AD586BEFFFD}" type="datetime1">
               <a:rPr lang="en-CA" smtClean="0"/>
-              <a:t>2021-05-02</a:t>
+              <a:t>2021-05-03</a:t>
             </a:fld>
             <a:endParaRPr lang="en-CA"/>
           </a:p>
@@ -4888,7 +4888,7 @@
           <a:p>
             <a:fld id="{B70F6ABA-023A-4E7E-9A89-58D5A720A925}" type="datetime1">
               <a:rPr lang="en-CA" smtClean="0"/>
-              <a:t>2021-05-02</a:t>
+              <a:t>2021-05-03</a:t>
             </a:fld>
             <a:endParaRPr lang="en-CA"/>
           </a:p>
@@ -5339,7 +5339,7 @@
                   <a:schemeClr val="tx1"/>
                 </a:solidFill>
               </a:rPr>
-              <a:t>Associate Director</a:t>
+              <a:t>Associate Director - Engineering</a:t>
             </a:r>
           </a:p>
           <a:p>
@@ -13402,8 +13402,13 @@
             </a:pPr>
             <a:r>
               <a:rPr lang="en-CA" dirty="0"/>
-              <a:t>By default openly available source code, full documentation, all data</a:t>
-            </a:r>
+              <a:t>By default openly available source code, full documentation, all data </a:t>
+            </a:r>
+            <a:r>
+              <a:rPr lang="en-CA" sz="1900" dirty="0"/>
+              <a:t>*sharing lots of data is getting difficult now</a:t>
+            </a:r>
+            <a:endParaRPr lang="en-CA" dirty="0"/>
           </a:p>
           <a:p>
             <a:pPr marL="357188" indent="-357188">

</xml_diff>

<commit_message>
Update Slicer architecture slide
</commit_message>
<xml_diff>
--- a/Doc/day1_1_PerkLabResearchMethodology.pptx
+++ b/Doc/day1_1_PerkLabResearchMethodology.pptx
@@ -2898,7 +2898,7 @@
             <a:fld id="{A6E16264-6225-448A-8F6B-37C607BF693C}" type="datetimeFigureOut">
               <a:rPr lang="en-CA" smtClean="0"/>
               <a:pPr/>
-              <a:t>2021-05-03</a:t>
+              <a:t>2021-12-07</a:t>
             </a:fld>
             <a:endParaRPr lang="en-CA"/>
           </a:p>
@@ -4104,7 +4104,7 @@
           <a:p>
             <a:fld id="{9FE18F2B-46EB-42F1-ADBB-7DC15FF809A9}" type="datetime1">
               <a:rPr lang="en-CA" smtClean="0"/>
-              <a:t>2021-05-03</a:t>
+              <a:t>2021-12-07</a:t>
             </a:fld>
             <a:endParaRPr lang="en-CA" dirty="0"/>
           </a:p>
@@ -4402,7 +4402,7 @@
           <a:p>
             <a:fld id="{89909B16-C605-46D9-9901-5F215FFB9844}" type="datetime1">
               <a:rPr lang="en-CA" smtClean="0"/>
-              <a:t>2021-05-03</a:t>
+              <a:t>2021-12-07</a:t>
             </a:fld>
             <a:endParaRPr lang="en-CA"/>
           </a:p>
@@ -4606,7 +4606,7 @@
           <a:p>
             <a:fld id="{9FB522E9-13A7-4907-A4DF-6AD586BEFFFD}" type="datetime1">
               <a:rPr lang="en-CA" smtClean="0"/>
-              <a:t>2021-05-03</a:t>
+              <a:t>2021-12-07</a:t>
             </a:fld>
             <a:endParaRPr lang="en-CA"/>
           </a:p>
@@ -4888,7 +4888,7 @@
           <a:p>
             <a:fld id="{B70F6ABA-023A-4E7E-9A89-58D5A720A925}" type="datetime1">
               <a:rPr lang="en-CA" smtClean="0"/>
-              <a:t>2021-05-03</a:t>
+              <a:t>2021-12-07</a:t>
             </a:fld>
             <a:endParaRPr lang="en-CA"/>
           </a:p>
@@ -8964,6 +8964,180 @@
       </p:grpSpPr>
       <p:cxnSp>
         <p:nvCxnSpPr>
+          <p:cNvPr id="138" name="Straight Connector 137">
+            <a:extLst>
+              <a:ext uri="{FF2B5EF4-FFF2-40B4-BE49-F238E27FC236}">
+                <a16:creationId xmlns:a16="http://schemas.microsoft.com/office/drawing/2014/main" id="{0A8AAAF1-3190-485C-AD5A-1A0CD157E1BC}"/>
+              </a:ext>
+            </a:extLst>
+          </p:cNvPr>
+          <p:cNvCxnSpPr/>
+          <p:nvPr/>
+        </p:nvCxnSpPr>
+        <p:spPr>
+          <a:xfrm>
+            <a:off x="899592" y="2573323"/>
+            <a:ext cx="0" cy="585508"/>
+          </a:xfrm>
+          <a:prstGeom prst="line">
+            <a:avLst/>
+          </a:prstGeom>
+          <a:ln w="31750">
+            <a:solidFill>
+              <a:schemeClr val="tx1"/>
+            </a:solidFill>
+            <a:prstDash val="solid"/>
+          </a:ln>
+        </p:spPr>
+        <p:style>
+          <a:lnRef idx="1">
+            <a:schemeClr val="accent1"/>
+          </a:lnRef>
+          <a:fillRef idx="0">
+            <a:schemeClr val="accent1"/>
+          </a:fillRef>
+          <a:effectRef idx="0">
+            <a:schemeClr val="accent1"/>
+          </a:effectRef>
+          <a:fontRef idx="minor">
+            <a:schemeClr val="tx1"/>
+          </a:fontRef>
+        </p:style>
+      </p:cxnSp>
+      <p:cxnSp>
+        <p:nvCxnSpPr>
+          <p:cNvPr id="134" name="Straight Connector 133">
+            <a:extLst>
+              <a:ext uri="{FF2B5EF4-FFF2-40B4-BE49-F238E27FC236}">
+                <a16:creationId xmlns:a16="http://schemas.microsoft.com/office/drawing/2014/main" id="{77F42C50-E2EE-452C-A378-5134D6A1162B}"/>
+              </a:ext>
+            </a:extLst>
+          </p:cNvPr>
+          <p:cNvCxnSpPr>
+            <a:cxnSpLocks/>
+          </p:cNvCxnSpPr>
+          <p:nvPr/>
+        </p:nvCxnSpPr>
+        <p:spPr>
+          <a:xfrm>
+            <a:off x="628805" y="4509120"/>
+            <a:ext cx="894377" cy="0"/>
+          </a:xfrm>
+          <a:prstGeom prst="line">
+            <a:avLst/>
+          </a:prstGeom>
+          <a:ln w="31750">
+            <a:solidFill>
+              <a:schemeClr val="tx1"/>
+            </a:solidFill>
+          </a:ln>
+          <a:effectLst/>
+        </p:spPr>
+        <p:style>
+          <a:lnRef idx="1">
+            <a:schemeClr val="accent3"/>
+          </a:lnRef>
+          <a:fillRef idx="2">
+            <a:schemeClr val="accent3"/>
+          </a:fillRef>
+          <a:effectRef idx="1">
+            <a:schemeClr val="accent3"/>
+          </a:effectRef>
+          <a:fontRef idx="minor">
+            <a:schemeClr val="dk1"/>
+          </a:fontRef>
+        </p:style>
+      </p:cxnSp>
+      <p:cxnSp>
+        <p:nvCxnSpPr>
+          <p:cNvPr id="135" name="Straight Connector 134">
+            <a:extLst>
+              <a:ext uri="{FF2B5EF4-FFF2-40B4-BE49-F238E27FC236}">
+                <a16:creationId xmlns:a16="http://schemas.microsoft.com/office/drawing/2014/main" id="{8F058F56-8BB3-417E-B933-395E59031B33}"/>
+              </a:ext>
+            </a:extLst>
+          </p:cNvPr>
+          <p:cNvCxnSpPr>
+            <a:cxnSpLocks/>
+          </p:cNvCxnSpPr>
+          <p:nvPr/>
+        </p:nvCxnSpPr>
+        <p:spPr>
+          <a:xfrm flipV="1">
+            <a:off x="827584" y="3455597"/>
+            <a:ext cx="0" cy="909507"/>
+          </a:xfrm>
+          <a:prstGeom prst="line">
+            <a:avLst/>
+          </a:prstGeom>
+          <a:ln w="31750">
+            <a:solidFill>
+              <a:schemeClr val="tx1"/>
+            </a:solidFill>
+          </a:ln>
+          <a:effectLst/>
+        </p:spPr>
+        <p:style>
+          <a:lnRef idx="1">
+            <a:schemeClr val="accent3"/>
+          </a:lnRef>
+          <a:fillRef idx="2">
+            <a:schemeClr val="accent3"/>
+          </a:fillRef>
+          <a:effectRef idx="1">
+            <a:schemeClr val="accent3"/>
+          </a:effectRef>
+          <a:fontRef idx="minor">
+            <a:schemeClr val="dk1"/>
+          </a:fontRef>
+        </p:style>
+      </p:cxnSp>
+      <p:cxnSp>
+        <p:nvCxnSpPr>
+          <p:cNvPr id="114" name="Straight Connector 113">
+            <a:extLst>
+              <a:ext uri="{FF2B5EF4-FFF2-40B4-BE49-F238E27FC236}">
+                <a16:creationId xmlns:a16="http://schemas.microsoft.com/office/drawing/2014/main" id="{7AF4C03D-EC00-4E86-9682-57AE794DD32D}"/>
+              </a:ext>
+            </a:extLst>
+          </p:cNvPr>
+          <p:cNvCxnSpPr>
+            <a:cxnSpLocks/>
+          </p:cNvCxnSpPr>
+          <p:nvPr/>
+        </p:nvCxnSpPr>
+        <p:spPr>
+          <a:xfrm>
+            <a:off x="5909871" y="4581128"/>
+            <a:ext cx="894377" cy="0"/>
+          </a:xfrm>
+          <a:prstGeom prst="line">
+            <a:avLst/>
+          </a:prstGeom>
+          <a:ln w="31750">
+            <a:solidFill>
+              <a:schemeClr val="tx1"/>
+            </a:solidFill>
+          </a:ln>
+          <a:effectLst/>
+        </p:spPr>
+        <p:style>
+          <a:lnRef idx="1">
+            <a:schemeClr val="accent3"/>
+          </a:lnRef>
+          <a:fillRef idx="2">
+            <a:schemeClr val="accent3"/>
+          </a:fillRef>
+          <a:effectRef idx="1">
+            <a:schemeClr val="accent3"/>
+          </a:effectRef>
+          <a:fontRef idx="minor">
+            <a:schemeClr val="dk1"/>
+          </a:fontRef>
+        </p:style>
+      </p:cxnSp>
+      <p:cxnSp>
+        <p:nvCxnSpPr>
           <p:cNvPr id="126" name="Straight Connector 125">
             <a:extLst>
               <a:ext uri="{FF2B5EF4-FFF2-40B4-BE49-F238E27FC236}">
@@ -10219,13 +10393,15 @@
       <p:cxnSp>
         <p:nvCxnSpPr>
           <p:cNvPr id="107" name="Straight Connector 106"/>
-          <p:cNvCxnSpPr/>
+          <p:cNvCxnSpPr>
+            <a:cxnSpLocks/>
+          </p:cNvCxnSpPr>
           <p:nvPr/>
         </p:nvCxnSpPr>
         <p:spPr>
           <a:xfrm>
             <a:off x="5200805" y="3718437"/>
-            <a:ext cx="1830801" cy="0"/>
+            <a:ext cx="2317782" cy="0"/>
           </a:xfrm>
           <a:prstGeom prst="line">
             <a:avLst/>
@@ -10296,7 +10472,7 @@
         </p:nvCxnSpPr>
         <p:spPr>
           <a:xfrm flipV="1">
-            <a:off x="7029605" y="3718437"/>
+            <a:off x="7524328" y="3718437"/>
             <a:ext cx="0" cy="1745536"/>
           </a:xfrm>
           <a:prstGeom prst="line">
@@ -10819,7 +10995,7 @@
         </p:nvSpPr>
         <p:spPr>
           <a:xfrm>
-            <a:off x="152400" y="2050504"/>
+            <a:off x="16419" y="1745375"/>
             <a:ext cx="1009805" cy="461665"/>
           </a:xfrm>
           <a:prstGeom prst="rect">
@@ -10848,7 +11024,7 @@
         </p:nvCxnSpPr>
         <p:spPr>
           <a:xfrm flipV="1">
-            <a:off x="7805561" y="3654296"/>
+            <a:off x="8227653" y="3654296"/>
             <a:ext cx="0" cy="1962077"/>
           </a:xfrm>
           <a:prstGeom prst="line">
@@ -10884,7 +11060,7 @@
         </p:nvSpPr>
         <p:spPr>
           <a:xfrm>
-            <a:off x="7246252" y="3542533"/>
+            <a:off x="7668344" y="3542533"/>
             <a:ext cx="1154953" cy="341236"/>
           </a:xfrm>
           <a:prstGeom prst="rect">
@@ -11250,52 +11426,6 @@
                 </a:solidFill>
               </a:rPr>
               <a:t>Surgical microscopes, endoscopes</a:t>
-            </a:r>
-          </a:p>
-        </p:txBody>
-      </p:sp>
-      <p:sp>
-        <p:nvSpPr>
-          <p:cNvPr id="106" name="Rectangle 105"/>
-          <p:cNvSpPr/>
-          <p:nvPr/>
-        </p:nvSpPr>
-        <p:spPr>
-          <a:xfrm>
-            <a:off x="6788581" y="5465646"/>
-            <a:ext cx="1432627" cy="394149"/>
-          </a:xfrm>
-          <a:prstGeom prst="rect">
-            <a:avLst/>
-          </a:prstGeom>
-          <a:ln/>
-        </p:spPr>
-        <p:style>
-          <a:lnRef idx="1">
-            <a:schemeClr val="accent1"/>
-          </a:lnRef>
-          <a:fillRef idx="2">
-            <a:schemeClr val="accent1"/>
-          </a:fillRef>
-          <a:effectRef idx="1">
-            <a:schemeClr val="accent1"/>
-          </a:effectRef>
-          <a:fontRef idx="minor">
-            <a:schemeClr val="dk1"/>
-          </a:fontRef>
-        </p:style>
-        <p:txBody>
-          <a:bodyPr rtlCol="0" anchor="ctr"/>
-          <a:lstStyle/>
-          <a:p>
-            <a:pPr algn="ctr"/>
-            <a:r>
-              <a:rPr lang="en-CA" sz="1200" b="1" dirty="0">
-                <a:solidFill>
-                  <a:schemeClr val="tx1"/>
-                </a:solidFill>
-              </a:rPr>
-              <a:t>MRI, CT, PET scanners</a:t>
             </a:r>
           </a:p>
         </p:txBody>
@@ -11771,6 +11901,348 @@
           </a:extLst>
         </p:spPr>
       </p:pic>
+      <p:cxnSp>
+        <p:nvCxnSpPr>
+          <p:cNvPr id="98" name="Straight Connector 97">
+            <a:extLst>
+              <a:ext uri="{FF2B5EF4-FFF2-40B4-BE49-F238E27FC236}">
+                <a16:creationId xmlns:a16="http://schemas.microsoft.com/office/drawing/2014/main" id="{9F2D9A5E-E29A-4D27-816C-E0D6F7255F7E}"/>
+              </a:ext>
+            </a:extLst>
+          </p:cNvPr>
+          <p:cNvCxnSpPr>
+            <a:cxnSpLocks/>
+          </p:cNvCxnSpPr>
+          <p:nvPr/>
+        </p:nvCxnSpPr>
+        <p:spPr>
+          <a:xfrm>
+            <a:off x="7812360" y="5616373"/>
+            <a:ext cx="415293" cy="0"/>
+          </a:xfrm>
+          <a:prstGeom prst="line">
+            <a:avLst/>
+          </a:prstGeom>
+          <a:ln w="31750">
+            <a:solidFill>
+              <a:schemeClr val="tx1"/>
+            </a:solidFill>
+          </a:ln>
+          <a:effectLst/>
+        </p:spPr>
+        <p:style>
+          <a:lnRef idx="1">
+            <a:schemeClr val="accent3"/>
+          </a:lnRef>
+          <a:fillRef idx="2">
+            <a:schemeClr val="accent3"/>
+          </a:fillRef>
+          <a:effectRef idx="1">
+            <a:schemeClr val="accent3"/>
+          </a:effectRef>
+          <a:fontRef idx="minor">
+            <a:schemeClr val="dk1"/>
+          </a:fontRef>
+        </p:style>
+      </p:cxnSp>
+      <p:sp>
+        <p:nvSpPr>
+          <p:cNvPr id="106" name="Rectangle 105"/>
+          <p:cNvSpPr/>
+          <p:nvPr/>
+        </p:nvSpPr>
+        <p:spPr>
+          <a:xfrm>
+            <a:off x="6644565" y="5465646"/>
+            <a:ext cx="1239803" cy="394149"/>
+          </a:xfrm>
+          <a:prstGeom prst="rect">
+            <a:avLst/>
+          </a:prstGeom>
+          <a:ln/>
+        </p:spPr>
+        <p:style>
+          <a:lnRef idx="1">
+            <a:schemeClr val="accent1"/>
+          </a:lnRef>
+          <a:fillRef idx="2">
+            <a:schemeClr val="accent1"/>
+          </a:fillRef>
+          <a:effectRef idx="1">
+            <a:schemeClr val="accent1"/>
+          </a:effectRef>
+          <a:fontRef idx="minor">
+            <a:schemeClr val="dk1"/>
+          </a:fontRef>
+        </p:style>
+        <p:txBody>
+          <a:bodyPr rtlCol="0" anchor="ctr"/>
+          <a:lstStyle/>
+          <a:p>
+            <a:pPr algn="ctr"/>
+            <a:r>
+              <a:rPr lang="en-CA" sz="1200" b="1" dirty="0">
+                <a:solidFill>
+                  <a:schemeClr val="tx1"/>
+                </a:solidFill>
+              </a:rPr>
+              <a:t>MRI, CT, PET scanners</a:t>
+            </a:r>
+          </a:p>
+        </p:txBody>
+      </p:sp>
+      <p:cxnSp>
+        <p:nvCxnSpPr>
+          <p:cNvPr id="102" name="Straight Connector 101">
+            <a:extLst>
+              <a:ext uri="{FF2B5EF4-FFF2-40B4-BE49-F238E27FC236}">
+                <a16:creationId xmlns:a16="http://schemas.microsoft.com/office/drawing/2014/main" id="{439F27C5-4895-46CD-B8A7-875DD8E08EAD}"/>
+              </a:ext>
+            </a:extLst>
+          </p:cNvPr>
+          <p:cNvCxnSpPr>
+            <a:cxnSpLocks/>
+          </p:cNvCxnSpPr>
+          <p:nvPr/>
+        </p:nvCxnSpPr>
+        <p:spPr>
+          <a:xfrm flipV="1">
+            <a:off x="6804248" y="3717032"/>
+            <a:ext cx="0" cy="585801"/>
+          </a:xfrm>
+          <a:prstGeom prst="line">
+            <a:avLst/>
+          </a:prstGeom>
+          <a:ln w="31750">
+            <a:solidFill>
+              <a:schemeClr val="tx1"/>
+            </a:solidFill>
+            <a:prstDash val="solid"/>
+          </a:ln>
+        </p:spPr>
+        <p:style>
+          <a:lnRef idx="1">
+            <a:schemeClr val="accent1"/>
+          </a:lnRef>
+          <a:fillRef idx="0">
+            <a:schemeClr val="accent1"/>
+          </a:fillRef>
+          <a:effectRef idx="0">
+            <a:schemeClr val="accent1"/>
+          </a:effectRef>
+          <a:fontRef idx="minor">
+            <a:schemeClr val="tx1"/>
+          </a:fontRef>
+        </p:style>
+      </p:cxnSp>
+      <p:sp>
+        <p:nvSpPr>
+          <p:cNvPr id="113" name="Rectangle 112">
+            <a:extLst>
+              <a:ext uri="{FF2B5EF4-FFF2-40B4-BE49-F238E27FC236}">
+                <a16:creationId xmlns:a16="http://schemas.microsoft.com/office/drawing/2014/main" id="{2F86EB33-5C19-4183-A027-B946549E5EEA}"/>
+              </a:ext>
+            </a:extLst>
+          </p:cNvPr>
+          <p:cNvSpPr/>
+          <p:nvPr/>
+        </p:nvSpPr>
+        <p:spPr>
+          <a:xfrm>
+            <a:off x="6387674" y="4148944"/>
+            <a:ext cx="920630" cy="1045847"/>
+          </a:xfrm>
+          <a:prstGeom prst="rect">
+            <a:avLst/>
+          </a:prstGeom>
+          <a:ln/>
+        </p:spPr>
+        <p:style>
+          <a:lnRef idx="1">
+            <a:schemeClr val="accent6"/>
+          </a:lnRef>
+          <a:fillRef idx="2">
+            <a:schemeClr val="accent6"/>
+          </a:fillRef>
+          <a:effectRef idx="1">
+            <a:schemeClr val="accent6"/>
+          </a:effectRef>
+          <a:fontRef idx="minor">
+            <a:schemeClr val="dk1"/>
+          </a:fontRef>
+        </p:style>
+        <p:txBody>
+          <a:bodyPr rtlCol="0" anchor="ctr"/>
+          <a:lstStyle/>
+          <a:p>
+            <a:pPr algn="ctr"/>
+            <a:r>
+              <a:rPr lang="en-US" sz="1200" b="1" dirty="0">
+                <a:solidFill>
+                  <a:schemeClr val="tx1"/>
+                </a:solidFill>
+              </a:rPr>
+              <a:t>Neural networks</a:t>
+            </a:r>
+          </a:p>
+        </p:txBody>
+      </p:sp>
+      <p:sp>
+        <p:nvSpPr>
+          <p:cNvPr id="125" name="Rectangle 124">
+            <a:extLst>
+              <a:ext uri="{FF2B5EF4-FFF2-40B4-BE49-F238E27FC236}">
+                <a16:creationId xmlns:a16="http://schemas.microsoft.com/office/drawing/2014/main" id="{3B7ABAD8-5DD4-4EDA-9C6D-1A4CD34E15D4}"/>
+              </a:ext>
+            </a:extLst>
+          </p:cNvPr>
+          <p:cNvSpPr/>
+          <p:nvPr/>
+        </p:nvSpPr>
+        <p:spPr>
+          <a:xfrm>
+            <a:off x="268766" y="4148055"/>
+            <a:ext cx="779076" cy="698910"/>
+          </a:xfrm>
+          <a:prstGeom prst="rect">
+            <a:avLst/>
+          </a:prstGeom>
+          <a:ln/>
+        </p:spPr>
+        <p:style>
+          <a:lnRef idx="1">
+            <a:schemeClr val="accent6"/>
+          </a:lnRef>
+          <a:fillRef idx="2">
+            <a:schemeClr val="accent6"/>
+          </a:fillRef>
+          <a:effectRef idx="1">
+            <a:schemeClr val="accent6"/>
+          </a:effectRef>
+          <a:fontRef idx="minor">
+            <a:schemeClr val="dk1"/>
+          </a:fontRef>
+        </p:style>
+        <p:txBody>
+          <a:bodyPr rtlCol="0" anchor="ctr"/>
+          <a:lstStyle/>
+          <a:p>
+            <a:pPr algn="ctr"/>
+            <a:r>
+              <a:rPr lang="en-US" sz="1200" b="1" dirty="0">
+                <a:solidFill>
+                  <a:schemeClr val="tx1"/>
+                </a:solidFill>
+              </a:rPr>
+              <a:t>Disk storage</a:t>
+            </a:r>
+          </a:p>
+        </p:txBody>
+      </p:sp>
+      <p:sp>
+        <p:nvSpPr>
+          <p:cNvPr id="137" name="Rectangle 136">
+            <a:extLst>
+              <a:ext uri="{FF2B5EF4-FFF2-40B4-BE49-F238E27FC236}">
+                <a16:creationId xmlns:a16="http://schemas.microsoft.com/office/drawing/2014/main" id="{749CC73D-7F0F-47C0-8F3F-C8B179CC9601}"/>
+              </a:ext>
+            </a:extLst>
+          </p:cNvPr>
+          <p:cNvSpPr/>
+          <p:nvPr/>
+        </p:nvSpPr>
+        <p:spPr>
+          <a:xfrm>
+            <a:off x="88510" y="2309962"/>
+            <a:ext cx="984614" cy="526723"/>
+          </a:xfrm>
+          <a:prstGeom prst="rect">
+            <a:avLst/>
+          </a:prstGeom>
+          <a:ln/>
+        </p:spPr>
+        <p:style>
+          <a:lnRef idx="1">
+            <a:schemeClr val="accent4"/>
+          </a:lnRef>
+          <a:fillRef idx="2">
+            <a:schemeClr val="accent4"/>
+          </a:fillRef>
+          <a:effectRef idx="1">
+            <a:schemeClr val="accent4"/>
+          </a:effectRef>
+          <a:fontRef idx="minor">
+            <a:schemeClr val="dk1"/>
+          </a:fontRef>
+        </p:style>
+        <p:txBody>
+          <a:bodyPr rtlCol="0" anchor="ctr"/>
+          <a:lstStyle/>
+          <a:p>
+            <a:pPr algn="ctr"/>
+            <a:r>
+              <a:rPr lang="en-US" sz="1200" b="1" dirty="0">
+                <a:solidFill>
+                  <a:schemeClr val="tx1"/>
+                </a:solidFill>
+              </a:rPr>
+              <a:t>Neural networks</a:t>
+            </a:r>
+          </a:p>
+        </p:txBody>
+      </p:sp>
+      <p:sp>
+        <p:nvSpPr>
+          <p:cNvPr id="140" name="Rectangle 139">
+            <a:extLst>
+              <a:ext uri="{FF2B5EF4-FFF2-40B4-BE49-F238E27FC236}">
+                <a16:creationId xmlns:a16="http://schemas.microsoft.com/office/drawing/2014/main" id="{4F9AC310-EB00-489D-A119-26917C26AC90}"/>
+              </a:ext>
+            </a:extLst>
+          </p:cNvPr>
+          <p:cNvSpPr/>
+          <p:nvPr/>
+        </p:nvSpPr>
+        <p:spPr>
+          <a:xfrm>
+            <a:off x="3449211" y="3549944"/>
+            <a:ext cx="1054715" cy="341236"/>
+          </a:xfrm>
+          <a:prstGeom prst="rect">
+            <a:avLst/>
+          </a:prstGeom>
+          <a:ln/>
+        </p:spPr>
+        <p:style>
+          <a:lnRef idx="1">
+            <a:schemeClr val="accent3"/>
+          </a:lnRef>
+          <a:fillRef idx="2">
+            <a:schemeClr val="accent3"/>
+          </a:fillRef>
+          <a:effectRef idx="1">
+            <a:schemeClr val="accent3"/>
+          </a:effectRef>
+          <a:fontRef idx="minor">
+            <a:schemeClr val="dk1"/>
+          </a:fontRef>
+        </p:style>
+        <p:txBody>
+          <a:bodyPr rtlCol="0" anchor="ctr"/>
+          <a:lstStyle/>
+          <a:p>
+            <a:pPr algn="ctr"/>
+            <a:r>
+              <a:rPr lang="en-CA" sz="1200" b="1" dirty="0">
+                <a:solidFill>
+                  <a:schemeClr val="tx1"/>
+                </a:solidFill>
+              </a:rPr>
+              <a:t>Parallel processing</a:t>
+            </a:r>
+          </a:p>
+        </p:txBody>
+      </p:sp>
     </p:spTree>
     <p:extLst>
       <p:ext uri="{BB962C8B-B14F-4D97-AF65-F5344CB8AC3E}">

</xml_diff>